<commit_message>
updated the design review
Added the train model powerpoint slides (description sequence use-case
and class diagrams)
</commit_message>
<xml_diff>
--- a/Design Review/DesignReview.pptx
+++ b/Design Review/DesignReview.pptx
@@ -13,12 +13,15 @@
     <p:sldId id="265" r:id="rId7"/>
     <p:sldId id="266" r:id="rId8"/>
     <p:sldId id="267" r:id="rId9"/>
-    <p:sldId id="260" r:id="rId10"/>
-    <p:sldId id="261" r:id="rId11"/>
-    <p:sldId id="268" r:id="rId12"/>
-    <p:sldId id="269" r:id="rId13"/>
-    <p:sldId id="262" r:id="rId14"/>
-    <p:sldId id="263" r:id="rId15"/>
+    <p:sldId id="272" r:id="rId10"/>
+    <p:sldId id="260" r:id="rId11"/>
+    <p:sldId id="270" r:id="rId12"/>
+    <p:sldId id="271" r:id="rId13"/>
+    <p:sldId id="263" r:id="rId14"/>
+    <p:sldId id="261" r:id="rId15"/>
+    <p:sldId id="268" r:id="rId16"/>
+    <p:sldId id="269" r:id="rId17"/>
+    <p:sldId id="262" r:id="rId18"/>
   </p:sldIdLst>
   <p:sldSz cx="9144000" cy="6858000" type="screen4x3"/>
   <p:notesSz cx="6858000" cy="9144000"/>
@@ -3290,10 +3293,387 @@
   <p:clrMapOvr>
     <a:masterClrMapping/>
   </p:clrMapOvr>
+  <p:timing>
+    <p:tnLst>
+      <p:par>
+        <p:cTn id="1" dur="indefinite" restart="never" nodeType="tmRoot"/>
+      </p:par>
+    </p:tnLst>
+  </p:timing>
 </p:sld>
 </file>
 
 <file path=ppt/slides/slide10.xml><?xml version="1.0" encoding="utf-8"?>
+<p:sld xmlns:a="http://schemas.openxmlformats.org/drawingml/2006/main" xmlns:r="http://schemas.openxmlformats.org/officeDocument/2006/relationships" xmlns:p="http://schemas.openxmlformats.org/presentationml/2006/main">
+  <p:cSld>
+    <p:spTree>
+      <p:nvGrpSpPr>
+        <p:cNvPr id="1" name=""/>
+        <p:cNvGrpSpPr/>
+        <p:nvPr/>
+      </p:nvGrpSpPr>
+      <p:grpSpPr>
+        <a:xfrm>
+          <a:off x="0" y="0"/>
+          <a:ext cx="0" cy="0"/>
+          <a:chOff x="0" y="0"/>
+          <a:chExt cx="0" cy="0"/>
+        </a:xfrm>
+      </p:grpSpPr>
+      <p:sp>
+        <p:nvSpPr>
+          <p:cNvPr id="2" name="Title 1"/>
+          <p:cNvSpPr>
+            <a:spLocks noGrp="1"/>
+          </p:cNvSpPr>
+          <p:nvPr>
+            <p:ph type="title"/>
+          </p:nvPr>
+        </p:nvSpPr>
+        <p:spPr/>
+        <p:txBody>
+          <a:bodyPr/>
+          <a:lstStyle/>
+          <a:p>
+            <a:r>
+              <a:rPr lang="en-US" dirty="0" smtClean="0"/>
+              <a:t>Train </a:t>
+            </a:r>
+            <a:r>
+              <a:rPr lang="en-US" dirty="0" smtClean="0"/>
+              <a:t>Model/Controller: </a:t>
+            </a:r>
+            <a:r>
+              <a:rPr lang="en-US" sz="3200" dirty="0"/>
+              <a:t>Use Cases</a:t>
+            </a:r>
+            <a:endParaRPr lang="en-US" sz="3200" dirty="0"/>
+          </a:p>
+        </p:txBody>
+      </p:sp>
+      <p:pic>
+        <p:nvPicPr>
+          <p:cNvPr id="4" name="Content Placeholder 3"/>
+          <p:cNvPicPr>
+            <a:picLocks noGrp="1" noChangeAspect="1"/>
+          </p:cNvPicPr>
+          <p:nvPr>
+            <p:ph idx="1"/>
+          </p:nvPr>
+        </p:nvPicPr>
+        <p:blipFill>
+          <a:blip r:embed="rId2">
+            <a:extLst>
+              <a:ext uri="{28A0092B-C50C-407E-A947-70E740481C1C}">
+                <a14:useLocalDpi xmlns:a14="http://schemas.microsoft.com/office/drawing/2010/main" val="0"/>
+              </a:ext>
+            </a:extLst>
+          </a:blip>
+          <a:stretch>
+            <a:fillRect/>
+          </a:stretch>
+        </p:blipFill>
+        <p:spPr>
+          <a:xfrm>
+            <a:off x="457200" y="914400"/>
+            <a:ext cx="9307585" cy="8001000"/>
+          </a:xfrm>
+        </p:spPr>
+      </p:pic>
+    </p:spTree>
+    <p:extLst>
+      <p:ext uri="{BB962C8B-B14F-4D97-AF65-F5344CB8AC3E}">
+        <p14:creationId xmlns:p14="http://schemas.microsoft.com/office/powerpoint/2010/main" val="3131609810"/>
+      </p:ext>
+    </p:extLst>
+  </p:cSld>
+  <p:clrMapOvr>
+    <a:masterClrMapping/>
+  </p:clrMapOvr>
+  <p:timing>
+    <p:tnLst>
+      <p:par>
+        <p:cTn id="1" dur="indefinite" restart="never" nodeType="tmRoot"/>
+      </p:par>
+    </p:tnLst>
+  </p:timing>
+</p:sld>
+</file>
+
+<file path=ppt/slides/slide11.xml><?xml version="1.0" encoding="utf-8"?>
+<p:sld xmlns:a="http://schemas.openxmlformats.org/drawingml/2006/main" xmlns:r="http://schemas.openxmlformats.org/officeDocument/2006/relationships" xmlns:p="http://schemas.openxmlformats.org/presentationml/2006/main">
+  <p:cSld>
+    <p:spTree>
+      <p:nvGrpSpPr>
+        <p:cNvPr id="1" name=""/>
+        <p:cNvGrpSpPr/>
+        <p:nvPr/>
+      </p:nvGrpSpPr>
+      <p:grpSpPr>
+        <a:xfrm>
+          <a:off x="0" y="0"/>
+          <a:ext cx="0" cy="0"/>
+          <a:chOff x="0" y="0"/>
+          <a:chExt cx="0" cy="0"/>
+        </a:xfrm>
+      </p:grpSpPr>
+      <p:pic>
+        <p:nvPicPr>
+          <p:cNvPr id="4" name="Content Placeholder 3"/>
+          <p:cNvPicPr>
+            <a:picLocks noGrp="1" noChangeAspect="1"/>
+          </p:cNvPicPr>
+          <p:nvPr>
+            <p:ph idx="1"/>
+          </p:nvPr>
+        </p:nvPicPr>
+        <p:blipFill>
+          <a:blip r:embed="rId2">
+            <a:extLst>
+              <a:ext uri="{28A0092B-C50C-407E-A947-70E740481C1C}">
+                <a14:useLocalDpi xmlns:a14="http://schemas.microsoft.com/office/drawing/2010/main" val="0"/>
+              </a:ext>
+            </a:extLst>
+          </a:blip>
+          <a:stretch>
+            <a:fillRect/>
+          </a:stretch>
+        </p:blipFill>
+        <p:spPr>
+          <a:xfrm>
+            <a:off x="-1143000" y="0"/>
+            <a:ext cx="11276701" cy="11005737"/>
+          </a:xfrm>
+        </p:spPr>
+      </p:pic>
+      <p:sp>
+        <p:nvSpPr>
+          <p:cNvPr id="2" name="Title 1"/>
+          <p:cNvSpPr>
+            <a:spLocks noGrp="1"/>
+          </p:cNvSpPr>
+          <p:nvPr>
+            <p:ph type="title"/>
+          </p:nvPr>
+        </p:nvSpPr>
+        <p:spPr/>
+        <p:txBody>
+          <a:bodyPr/>
+          <a:lstStyle/>
+          <a:p>
+            <a:r>
+              <a:rPr lang="en-US" dirty="0" smtClean="0"/>
+              <a:t>Train </a:t>
+            </a:r>
+            <a:r>
+              <a:rPr lang="en-US" dirty="0" smtClean="0"/>
+              <a:t>Model: Class Diagram</a:t>
+            </a:r>
+            <a:endParaRPr lang="en-US" dirty="0"/>
+          </a:p>
+        </p:txBody>
+      </p:sp>
+    </p:spTree>
+    <p:extLst>
+      <p:ext uri="{BB962C8B-B14F-4D97-AF65-F5344CB8AC3E}">
+        <p14:creationId xmlns:p14="http://schemas.microsoft.com/office/powerpoint/2010/main" val="3029079458"/>
+      </p:ext>
+    </p:extLst>
+  </p:cSld>
+  <p:clrMapOvr>
+    <a:masterClrMapping/>
+  </p:clrMapOvr>
+  <p:timing>
+    <p:tnLst>
+      <p:par>
+        <p:cTn id="1" dur="indefinite" restart="never" nodeType="tmRoot"/>
+      </p:par>
+    </p:tnLst>
+  </p:timing>
+</p:sld>
+</file>
+
+<file path=ppt/slides/slide12.xml><?xml version="1.0" encoding="utf-8"?>
+<p:sld xmlns:a="http://schemas.openxmlformats.org/drawingml/2006/main" xmlns:r="http://schemas.openxmlformats.org/officeDocument/2006/relationships" xmlns:p="http://schemas.openxmlformats.org/presentationml/2006/main">
+  <p:cSld>
+    <p:spTree>
+      <p:nvGrpSpPr>
+        <p:cNvPr id="1" name=""/>
+        <p:cNvGrpSpPr/>
+        <p:nvPr/>
+      </p:nvGrpSpPr>
+      <p:grpSpPr>
+        <a:xfrm>
+          <a:off x="0" y="0"/>
+          <a:ext cx="0" cy="0"/>
+          <a:chOff x="0" y="0"/>
+          <a:chExt cx="0" cy="0"/>
+        </a:xfrm>
+      </p:grpSpPr>
+      <p:sp>
+        <p:nvSpPr>
+          <p:cNvPr id="2" name="Title 1"/>
+          <p:cNvSpPr>
+            <a:spLocks noGrp="1"/>
+          </p:cNvSpPr>
+          <p:nvPr>
+            <p:ph type="title"/>
+          </p:nvPr>
+        </p:nvSpPr>
+        <p:spPr/>
+        <p:txBody>
+          <a:bodyPr/>
+          <a:lstStyle/>
+          <a:p>
+            <a:r>
+              <a:rPr lang="en-US" dirty="0" smtClean="0"/>
+              <a:t>Train </a:t>
+            </a:r>
+            <a:r>
+              <a:rPr lang="en-US" dirty="0" smtClean="0"/>
+              <a:t>Model: </a:t>
+            </a:r>
+            <a:r>
+              <a:rPr lang="en-US" sz="3200" dirty="0"/>
+              <a:t>Sequence Diagram</a:t>
+            </a:r>
+            <a:endParaRPr lang="en-US" sz="3200" dirty="0"/>
+          </a:p>
+        </p:txBody>
+      </p:sp>
+      <p:pic>
+        <p:nvPicPr>
+          <p:cNvPr id="9" name="Content Placeholder 8"/>
+          <p:cNvPicPr>
+            <a:picLocks noGrp="1" noChangeAspect="1"/>
+          </p:cNvPicPr>
+          <p:nvPr>
+            <p:ph idx="1"/>
+          </p:nvPr>
+        </p:nvPicPr>
+        <p:blipFill>
+          <a:blip r:embed="rId2">
+            <a:extLst>
+              <a:ext uri="{28A0092B-C50C-407E-A947-70E740481C1C}">
+                <a14:useLocalDpi xmlns:a14="http://schemas.microsoft.com/office/drawing/2010/main" val="0"/>
+              </a:ext>
+            </a:extLst>
+          </a:blip>
+          <a:stretch>
+            <a:fillRect/>
+          </a:stretch>
+        </p:blipFill>
+        <p:spPr>
+          <a:xfrm>
+            <a:off x="38100" y="1600200"/>
+            <a:ext cx="8344808" cy="4416954"/>
+          </a:xfrm>
+        </p:spPr>
+      </p:pic>
+    </p:spTree>
+    <p:extLst>
+      <p:ext uri="{BB962C8B-B14F-4D97-AF65-F5344CB8AC3E}">
+        <p14:creationId xmlns:p14="http://schemas.microsoft.com/office/powerpoint/2010/main" val="3029079458"/>
+      </p:ext>
+    </p:extLst>
+  </p:cSld>
+  <p:clrMapOvr>
+    <a:masterClrMapping/>
+  </p:clrMapOvr>
+  <p:timing>
+    <p:tnLst>
+      <p:par>
+        <p:cTn id="1" dur="indefinite" restart="never" nodeType="tmRoot"/>
+      </p:par>
+    </p:tnLst>
+  </p:timing>
+</p:sld>
+</file>
+
+<file path=ppt/slides/slide13.xml><?xml version="1.0" encoding="utf-8"?>
+<p:sld xmlns:a="http://schemas.openxmlformats.org/drawingml/2006/main" xmlns:r="http://schemas.openxmlformats.org/officeDocument/2006/relationships" xmlns:p="http://schemas.openxmlformats.org/presentationml/2006/main">
+  <p:cSld>
+    <p:spTree>
+      <p:nvGrpSpPr>
+        <p:cNvPr id="1" name=""/>
+        <p:cNvGrpSpPr/>
+        <p:nvPr/>
+      </p:nvGrpSpPr>
+      <p:grpSpPr>
+        <a:xfrm>
+          <a:off x="0" y="0"/>
+          <a:ext cx="0" cy="0"/>
+          <a:chOff x="0" y="0"/>
+          <a:chExt cx="0" cy="0"/>
+        </a:xfrm>
+      </p:grpSpPr>
+      <p:sp>
+        <p:nvSpPr>
+          <p:cNvPr id="2" name="Title 1"/>
+          <p:cNvSpPr>
+            <a:spLocks noGrp="1"/>
+          </p:cNvSpPr>
+          <p:nvPr>
+            <p:ph type="title"/>
+          </p:nvPr>
+        </p:nvSpPr>
+        <p:spPr/>
+        <p:txBody>
+          <a:bodyPr/>
+          <a:lstStyle/>
+          <a:p>
+            <a:r>
+              <a:rPr lang="en-US" dirty="0"/>
+              <a:t>Train </a:t>
+            </a:r>
+            <a:r>
+              <a:rPr lang="en-US" dirty="0" smtClean="0"/>
+              <a:t>Controller</a:t>
+            </a:r>
+            <a:endParaRPr lang="en-US" dirty="0"/>
+          </a:p>
+        </p:txBody>
+      </p:sp>
+      <p:sp>
+        <p:nvSpPr>
+          <p:cNvPr id="3" name="Content Placeholder 2"/>
+          <p:cNvSpPr>
+            <a:spLocks noGrp="1"/>
+          </p:cNvSpPr>
+          <p:nvPr>
+            <p:ph idx="1"/>
+          </p:nvPr>
+        </p:nvSpPr>
+        <p:spPr/>
+        <p:txBody>
+          <a:bodyPr/>
+          <a:lstStyle/>
+          <a:p>
+            <a:endParaRPr lang="en-US"/>
+          </a:p>
+        </p:txBody>
+      </p:sp>
+    </p:spTree>
+    <p:extLst>
+      <p:ext uri="{BB962C8B-B14F-4D97-AF65-F5344CB8AC3E}">
+        <p14:creationId xmlns:p14="http://schemas.microsoft.com/office/powerpoint/2010/main" val="2748805991"/>
+      </p:ext>
+    </p:extLst>
+  </p:cSld>
+  <p:clrMapOvr>
+    <a:masterClrMapping/>
+  </p:clrMapOvr>
+  <p:timing>
+    <p:tnLst>
+      <p:par>
+        <p:cTn id="1" dur="indefinite" restart="never" nodeType="tmRoot"/>
+      </p:par>
+    </p:tnLst>
+  </p:timing>
+</p:sld>
+</file>
+
+<file path=ppt/slides/slide14.xml><?xml version="1.0" encoding="utf-8"?>
 <p:sld xmlns:a="http://schemas.openxmlformats.org/drawingml/2006/main" xmlns:r="http://schemas.openxmlformats.org/officeDocument/2006/relationships" xmlns:p="http://schemas.openxmlformats.org/presentationml/2006/main">
   <p:cSld>
     <p:spTree>
@@ -3388,10 +3768,17 @@
   <p:clrMapOvr>
     <a:masterClrMapping/>
   </p:clrMapOvr>
+  <p:timing>
+    <p:tnLst>
+      <p:par>
+        <p:cTn id="1" dur="indefinite" restart="never" nodeType="tmRoot"/>
+      </p:par>
+    </p:tnLst>
+  </p:timing>
 </p:sld>
 </file>
 
-<file path=ppt/slides/slide11.xml><?xml version="1.0" encoding="utf-8"?>
+<file path=ppt/slides/slide15.xml><?xml version="1.0" encoding="utf-8"?>
 <p:sld xmlns:a="http://schemas.openxmlformats.org/drawingml/2006/main" xmlns:r="http://schemas.openxmlformats.org/officeDocument/2006/relationships" xmlns:p="http://schemas.openxmlformats.org/presentationml/2006/main">
   <p:cSld>
     <p:spTree>
@@ -3490,10 +3877,17 @@
   <p:clrMapOvr>
     <a:masterClrMapping/>
   </p:clrMapOvr>
+  <p:timing>
+    <p:tnLst>
+      <p:par>
+        <p:cTn id="1" dur="indefinite" restart="never" nodeType="tmRoot"/>
+      </p:par>
+    </p:tnLst>
+  </p:timing>
 </p:sld>
 </file>
 
-<file path=ppt/slides/slide12.xml><?xml version="1.0" encoding="utf-8"?>
+<file path=ppt/slides/slide16.xml><?xml version="1.0" encoding="utf-8"?>
 <p:sld xmlns:a="http://schemas.openxmlformats.org/drawingml/2006/main" xmlns:r="http://schemas.openxmlformats.org/officeDocument/2006/relationships" xmlns:p="http://schemas.openxmlformats.org/presentationml/2006/main">
   <p:cSld>
     <p:spTree>
@@ -3596,10 +3990,17 @@
   <p:clrMapOvr>
     <a:masterClrMapping/>
   </p:clrMapOvr>
+  <p:timing>
+    <p:tnLst>
+      <p:par>
+        <p:cTn id="1" dur="indefinite" restart="never" nodeType="tmRoot"/>
+      </p:par>
+    </p:tnLst>
+  </p:timing>
 </p:sld>
 </file>
 
-<file path=ppt/slides/slide13.xml><?xml version="1.0" encoding="utf-8"?>
+<file path=ppt/slides/slide17.xml><?xml version="1.0" encoding="utf-8"?>
 <p:sld xmlns:a="http://schemas.openxmlformats.org/drawingml/2006/main" xmlns:r="http://schemas.openxmlformats.org/officeDocument/2006/relationships" xmlns:p="http://schemas.openxmlformats.org/presentationml/2006/main">
   <p:cSld>
     <p:spTree>
@@ -3662,82 +4063,6 @@
     <p:extLst>
       <p:ext uri="{BB962C8B-B14F-4D97-AF65-F5344CB8AC3E}">
         <p14:creationId xmlns:p14="http://schemas.microsoft.com/office/powerpoint/2010/main" val="2371159061"/>
-      </p:ext>
-    </p:extLst>
-  </p:cSld>
-  <p:clrMapOvr>
-    <a:masterClrMapping/>
-  </p:clrMapOvr>
-</p:sld>
-</file>
-
-<file path=ppt/slides/slide14.xml><?xml version="1.0" encoding="utf-8"?>
-<p:sld xmlns:a="http://schemas.openxmlformats.org/drawingml/2006/main" xmlns:r="http://schemas.openxmlformats.org/officeDocument/2006/relationships" xmlns:p="http://schemas.openxmlformats.org/presentationml/2006/main">
-  <p:cSld>
-    <p:spTree>
-      <p:nvGrpSpPr>
-        <p:cNvPr id="1" name=""/>
-        <p:cNvGrpSpPr/>
-        <p:nvPr/>
-      </p:nvGrpSpPr>
-      <p:grpSpPr>
-        <a:xfrm>
-          <a:off x="0" y="0"/>
-          <a:ext cx="0" cy="0"/>
-          <a:chOff x="0" y="0"/>
-          <a:chExt cx="0" cy="0"/>
-        </a:xfrm>
-      </p:grpSpPr>
-      <p:sp>
-        <p:nvSpPr>
-          <p:cNvPr id="2" name="Title 1"/>
-          <p:cNvSpPr>
-            <a:spLocks noGrp="1"/>
-          </p:cNvSpPr>
-          <p:nvPr>
-            <p:ph type="title"/>
-          </p:nvPr>
-        </p:nvSpPr>
-        <p:spPr/>
-        <p:txBody>
-          <a:bodyPr/>
-          <a:lstStyle/>
-          <a:p>
-            <a:r>
-              <a:rPr lang="en-US" dirty="0"/>
-              <a:t>Train </a:t>
-            </a:r>
-            <a:r>
-              <a:rPr lang="en-US" dirty="0" smtClean="0"/>
-              <a:t>Controller</a:t>
-            </a:r>
-            <a:endParaRPr lang="en-US" dirty="0"/>
-          </a:p>
-        </p:txBody>
-      </p:sp>
-      <p:sp>
-        <p:nvSpPr>
-          <p:cNvPr id="3" name="Content Placeholder 2"/>
-          <p:cNvSpPr>
-            <a:spLocks noGrp="1"/>
-          </p:cNvSpPr>
-          <p:nvPr>
-            <p:ph idx="1"/>
-          </p:nvPr>
-        </p:nvSpPr>
-        <p:spPr/>
-        <p:txBody>
-          <a:bodyPr/>
-          <a:lstStyle/>
-          <a:p>
-            <a:endParaRPr lang="en-US"/>
-          </a:p>
-        </p:txBody>
-      </p:sp>
-    </p:spTree>
-    <p:extLst>
-      <p:ext uri="{BB962C8B-B14F-4D97-AF65-F5344CB8AC3E}">
-        <p14:creationId xmlns:p14="http://schemas.microsoft.com/office/powerpoint/2010/main" val="2748805991"/>
       </p:ext>
     </p:extLst>
   </p:cSld>
@@ -3816,6 +4141,13 @@
   <p:clrMapOvr>
     <a:masterClrMapping/>
   </p:clrMapOvr>
+  <p:timing>
+    <p:tnLst>
+      <p:par>
+        <p:cTn id="1" dur="indefinite" restart="never" nodeType="tmRoot"/>
+      </p:par>
+    </p:tnLst>
+  </p:timing>
 </p:sld>
 </file>
 
@@ -3888,6 +4220,13 @@
   <p:clrMapOvr>
     <a:masterClrMapping/>
   </p:clrMapOvr>
+  <p:timing>
+    <p:tnLst>
+      <p:par>
+        <p:cTn id="1" dur="indefinite" restart="never" nodeType="tmRoot"/>
+      </p:par>
+    </p:tnLst>
+  </p:timing>
 </p:sld>
 </file>
 
@@ -4010,6 +4349,13 @@
   <p:clrMapOvr>
     <a:masterClrMapping/>
   </p:clrMapOvr>
+  <p:timing>
+    <p:tnLst>
+      <p:par>
+        <p:cTn id="1" dur="indefinite" restart="never" nodeType="tmRoot"/>
+      </p:par>
+    </p:tnLst>
+  </p:timing>
 </p:sld>
 </file>
 
@@ -4082,6 +4428,13 @@
   <p:clrMapOvr>
     <a:masterClrMapping/>
   </p:clrMapOvr>
+  <p:timing>
+    <p:tnLst>
+      <p:par>
+        <p:cTn id="1" dur="indefinite" restart="never" nodeType="tmRoot"/>
+      </p:par>
+    </p:tnLst>
+  </p:timing>
 </p:sld>
 </file>
 
@@ -4154,6 +4507,13 @@
   <p:clrMapOvr>
     <a:masterClrMapping/>
   </p:clrMapOvr>
+  <p:timing>
+    <p:tnLst>
+      <p:par>
+        <p:cTn id="1" dur="indefinite" restart="never" nodeType="tmRoot"/>
+      </p:par>
+    </p:tnLst>
+  </p:timing>
 </p:sld>
 </file>
 
@@ -4226,6 +4586,13 @@
   <p:clrMapOvr>
     <a:masterClrMapping/>
   </p:clrMapOvr>
+  <p:timing>
+    <p:tnLst>
+      <p:par>
+        <p:cTn id="1" dur="indefinite" restart="never" nodeType="tmRoot"/>
+      </p:par>
+    </p:tnLst>
+  </p:timing>
 </p:sld>
 </file>
 
@@ -4298,6 +4665,13 @@
   <p:clrMapOvr>
     <a:masterClrMapping/>
   </p:clrMapOvr>
+  <p:timing>
+    <p:tnLst>
+      <p:par>
+        <p:cTn id="1" dur="indefinite" restart="never" nodeType="tmRoot"/>
+      </p:par>
+    </p:tnLst>
+  </p:timing>
 </p:sld>
 </file>
 
@@ -4356,20 +4730,89 @@
           <a:bodyPr/>
           <a:lstStyle/>
           <a:p>
-            <a:endParaRPr lang="en-US"/>
+            <a:r>
+              <a:rPr lang="en-US" dirty="0" smtClean="0"/>
+              <a:t>Purpose</a:t>
+            </a:r>
+          </a:p>
+          <a:p>
+            <a:pPr lvl="1"/>
+            <a:r>
+              <a:rPr lang="en-US" dirty="0" smtClean="0"/>
+              <a:t>Accepts input </a:t>
+            </a:r>
+            <a:r>
+              <a:rPr lang="en-US" dirty="0"/>
+              <a:t>regarding the </a:t>
+            </a:r>
+            <a:r>
+              <a:rPr lang="en-US" dirty="0" err="1"/>
+              <a:t>setpoint</a:t>
+            </a:r>
+            <a:r>
+              <a:rPr lang="en-US" dirty="0"/>
+              <a:t> </a:t>
+            </a:r>
+            <a:r>
+              <a:rPr lang="en-US" dirty="0" smtClean="0"/>
+              <a:t>power, </a:t>
+            </a:r>
+            <a:r>
+              <a:rPr lang="en-US" dirty="0"/>
+              <a:t>brake command, speed limit, acceleration limit, deceleration limit, route information, temperature control, door open, door close, transponder input, track circuit input, and light controller for tunnel</a:t>
+            </a:r>
+            <a:r>
+              <a:rPr lang="en-US" dirty="0" smtClean="0"/>
+              <a:t>.</a:t>
+            </a:r>
+          </a:p>
+          <a:p>
+            <a:pPr lvl="1"/>
+            <a:r>
+              <a:rPr lang="en-US" dirty="0"/>
+              <a:t>Calculates the speed of the train based upon power input</a:t>
+            </a:r>
+            <a:r>
+              <a:rPr lang="en-US" dirty="0" smtClean="0"/>
+              <a:t>.</a:t>
+            </a:r>
+            <a:endParaRPr lang="en-US" dirty="0" smtClean="0"/>
+          </a:p>
+          <a:p>
+            <a:pPr lvl="1"/>
+            <a:r>
+              <a:rPr lang="en-US" dirty="0" smtClean="0"/>
+              <a:t>Displays information about next stop</a:t>
+            </a:r>
+            <a:endParaRPr lang="en-US" dirty="0" smtClean="0"/>
+          </a:p>
+          <a:p>
+            <a:pPr lvl="1"/>
+            <a:r>
+              <a:rPr lang="en-US" dirty="0" smtClean="0"/>
+              <a:t>Simulates train failures</a:t>
+            </a:r>
+            <a:endParaRPr lang="en-US" dirty="0"/>
           </a:p>
         </p:txBody>
       </p:sp>
     </p:spTree>
     <p:extLst>
       <p:ext uri="{BB962C8B-B14F-4D97-AF65-F5344CB8AC3E}">
-        <p14:creationId xmlns:p14="http://schemas.microsoft.com/office/powerpoint/2010/main" val="3131609810"/>
+        <p14:creationId xmlns:p14="http://schemas.microsoft.com/office/powerpoint/2010/main" val="121172839"/>
       </p:ext>
     </p:extLst>
   </p:cSld>
   <p:clrMapOvr>
     <a:masterClrMapping/>
   </p:clrMapOvr>
+  <p:timing>
+    <p:tnLst>
+      <p:par>
+        <p:cTn id="1" dur="indefinite" restart="never" nodeType="tmRoot"/>
+      </p:par>
+    </p:tnLst>
+  </p:timing>
 </p:sld>
 </file>
 

</xml_diff>

<commit_message>
added track model slides
</commit_message>
<xml_diff>
--- a/Design Review/DesignReview.pptx
+++ b/Design Review/DesignReview.pptx
@@ -21,7 +21,9 @@
     <p:sldId id="261" r:id="rId15"/>
     <p:sldId id="268" r:id="rId16"/>
     <p:sldId id="269" r:id="rId17"/>
-    <p:sldId id="262" r:id="rId18"/>
+    <p:sldId id="274" r:id="rId18"/>
+    <p:sldId id="262" r:id="rId19"/>
+    <p:sldId id="273" r:id="rId20"/>
   </p:sldIdLst>
   <p:sldSz cx="9144000" cy="6858000" type="screen4x3"/>
   <p:notesSz cx="6858000" cy="9144000"/>
@@ -3337,17 +3339,12 @@
           <a:p>
             <a:r>
               <a:rPr lang="en-US" dirty="0" smtClean="0"/>
-              <a:t>Train </a:t>
-            </a:r>
-            <a:r>
-              <a:rPr lang="en-US" dirty="0" smtClean="0"/>
-              <a:t>Model/Controller: </a:t>
+              <a:t>Train Model/Controller: </a:t>
             </a:r>
             <a:r>
               <a:rPr lang="en-US" sz="3200" dirty="0"/>
               <a:t>Use Cases</a:t>
             </a:r>
-            <a:endParaRPr lang="en-US" sz="3200" dirty="0"/>
           </a:p>
         </p:txBody>
       </p:sp>
@@ -3463,11 +3460,7 @@
           <a:p>
             <a:r>
               <a:rPr lang="en-US" dirty="0" smtClean="0"/>
-              <a:t>Train </a:t>
-            </a:r>
-            <a:r>
-              <a:rPr lang="en-US" dirty="0" smtClean="0"/>
-              <a:t>Model: Class Diagram</a:t>
+              <a:t>Train Model: Class Diagram</a:t>
             </a:r>
             <a:endParaRPr lang="en-US" dirty="0"/>
           </a:p>
@@ -3527,17 +3520,12 @@
           <a:p>
             <a:r>
               <a:rPr lang="en-US" dirty="0" smtClean="0"/>
-              <a:t>Train </a:t>
-            </a:r>
-            <a:r>
-              <a:rPr lang="en-US" dirty="0" smtClean="0"/>
-              <a:t>Model: </a:t>
+              <a:t>Train Model: </a:t>
             </a:r>
             <a:r>
               <a:rPr lang="en-US" sz="3200" dirty="0"/>
               <a:t>Sequence Diagram</a:t>
             </a:r>
-            <a:endParaRPr lang="en-US" sz="3200" dirty="0"/>
           </a:p>
         </p:txBody>
       </p:sp>
@@ -3705,13 +3693,17 @@
           <a:bodyPr/>
           <a:lstStyle/>
           <a:p>
-            <a:r>
-              <a:rPr lang="en-US"/>
-              <a:t>Track Controller</a:t>
-            </a:r>
+            <a:pPr algn="ctr"/>
             <a:r>
               <a:rPr lang="en-US" dirty="0" smtClean="0"/>
-              <a:t>: Use Cases</a:t>
+              <a:t>Use Cases: </a:t>
+            </a:r>
+            <a:br>
+              <a:rPr lang="en-US" dirty="0" smtClean="0"/>
+            </a:br>
+            <a:r>
+              <a:rPr lang="en-US" dirty="0" smtClean="0"/>
+              <a:t>Track Controller/Track Model</a:t>
             </a:r>
             <a:endParaRPr lang="en-US" dirty="0"/>
           </a:p>
@@ -3719,9 +3711,9 @@
       </p:sp>
       <p:pic>
         <p:nvPicPr>
-          <p:cNvPr id="3074" name="Picture 2" descr="C:\Users\coelabs\Desktop\UseCaseDiagram2.png"/>
+          <p:cNvPr id="3" name="Picture 2"/>
           <p:cNvPicPr>
-            <a:picLocks noChangeAspect="1" noChangeArrowheads="1"/>
+            <a:picLocks noChangeAspect="1"/>
           </p:cNvPicPr>
           <p:nvPr/>
         </p:nvPicPr>
@@ -3733,29 +3725,18 @@
               </a:ext>
             </a:extLst>
           </a:blip>
-          <a:srcRect/>
           <a:stretch>
             <a:fillRect/>
           </a:stretch>
         </p:blipFill>
-        <p:spPr bwMode="auto">
+        <p:spPr>
           <a:xfrm>
-            <a:off x="304800" y="1219200"/>
-            <a:ext cx="6964363" cy="5777841"/>
+            <a:off x="609600" y="1600200"/>
+            <a:ext cx="8648700" cy="4953000"/>
           </a:xfrm>
           <a:prstGeom prst="rect">
             <a:avLst/>
           </a:prstGeom>
-          <a:noFill/>
-          <a:extLst>
-            <a:ext uri="{909E8E84-426E-40DD-AFC4-6F175D3DCCD1}">
-              <a14:hiddenFill xmlns:a14="http://schemas.microsoft.com/office/drawing/2010/main">
-                <a:solidFill>
-                  <a:srgbClr val="FFFFFF"/>
-                </a:solidFill>
-              </a14:hiddenFill>
-            </a:ext>
-          </a:extLst>
         </p:spPr>
       </p:pic>
     </p:spTree>
@@ -4034,7 +4015,11 @@
           <a:p>
             <a:r>
               <a:rPr lang="en-US" dirty="0" smtClean="0"/>
-              <a:t>Track Model</a:t>
+              <a:t>Track </a:t>
+            </a:r>
+            <a:r>
+              <a:rPr lang="en-US" dirty="0" smtClean="0"/>
+              <a:t>Model</a:t>
             </a:r>
             <a:endParaRPr lang="en-US" dirty="0"/>
           </a:p>
@@ -4055,14 +4040,241 @@
           <a:bodyPr/>
           <a:lstStyle/>
           <a:p>
-            <a:endParaRPr lang="en-US"/>
-          </a:p>
-        </p:txBody>
-      </p:sp>
+            <a:r>
+              <a:rPr lang="en-US" dirty="0" smtClean="0"/>
+              <a:t>Purpose</a:t>
+            </a:r>
+          </a:p>
+          <a:p>
+            <a:pPr lvl="1"/>
+            <a:r>
+              <a:rPr lang="en-US" dirty="0" smtClean="0"/>
+              <a:t>C</a:t>
+            </a:r>
+            <a:r>
+              <a:rPr lang="en-US" dirty="0" smtClean="0"/>
+              <a:t>reates the train from an inputted Excel file</a:t>
+            </a:r>
+            <a:endParaRPr lang="en-US" dirty="0" smtClean="0"/>
+          </a:p>
+          <a:p>
+            <a:pPr lvl="1"/>
+            <a:r>
+              <a:rPr lang="en-US" dirty="0" smtClean="0"/>
+              <a:t>Implements a train detection circuit</a:t>
+            </a:r>
+            <a:endParaRPr lang="en-US" dirty="0" smtClean="0"/>
+          </a:p>
+          <a:p>
+            <a:pPr lvl="1"/>
+            <a:r>
+              <a:rPr lang="en-US" dirty="0" smtClean="0"/>
+              <a:t>Holds all info for each block in a Database</a:t>
+            </a:r>
+          </a:p>
+          <a:p>
+            <a:pPr lvl="2"/>
+            <a:r>
+              <a:rPr lang="en-US" dirty="0" smtClean="0"/>
+              <a:t>Returns block specifications when track controller requests for them</a:t>
+            </a:r>
+            <a:endParaRPr lang="en-US" dirty="0" smtClean="0"/>
+          </a:p>
+          <a:p>
+            <a:pPr lvl="1"/>
+            <a:r>
+              <a:rPr lang="en-US" dirty="0" smtClean="0"/>
+              <a:t>Status Indicators for broken rails, track detection circuit failure and power failure</a:t>
+            </a:r>
+          </a:p>
+          <a:p>
+            <a:pPr marL="411480" lvl="1" indent="0">
+              <a:buNone/>
+            </a:pPr>
+            <a:endParaRPr lang="en-US" dirty="0"/>
+          </a:p>
+        </p:txBody>
+      </p:sp>
+    </p:spTree>
+    <p:extLst>
+      <p:ext uri="{BB962C8B-B14F-4D97-AF65-F5344CB8AC3E}">
+        <p14:creationId xmlns:p14="http://schemas.microsoft.com/office/powerpoint/2010/main" val="3960063686"/>
+      </p:ext>
+    </p:extLst>
+  </p:cSld>
+  <p:clrMapOvr>
+    <a:masterClrMapping/>
+  </p:clrMapOvr>
+  <p:timing>
+    <p:tnLst>
+      <p:par>
+        <p:cTn id="1" dur="indefinite" restart="never" nodeType="tmRoot"/>
+      </p:par>
+    </p:tnLst>
+  </p:timing>
+</p:sld>
+</file>
+
+<file path=ppt/slides/slide18.xml><?xml version="1.0" encoding="utf-8"?>
+<p:sld xmlns:a="http://schemas.openxmlformats.org/drawingml/2006/main" xmlns:r="http://schemas.openxmlformats.org/officeDocument/2006/relationships" xmlns:p="http://schemas.openxmlformats.org/presentationml/2006/main">
+  <p:cSld>
+    <p:spTree>
+      <p:nvGrpSpPr>
+        <p:cNvPr id="1" name=""/>
+        <p:cNvGrpSpPr/>
+        <p:nvPr/>
+      </p:nvGrpSpPr>
+      <p:grpSpPr>
+        <a:xfrm>
+          <a:off x="0" y="0"/>
+          <a:ext cx="0" cy="0"/>
+          <a:chOff x="0" y="0"/>
+          <a:chExt cx="0" cy="0"/>
+        </a:xfrm>
+      </p:grpSpPr>
+      <p:sp>
+        <p:nvSpPr>
+          <p:cNvPr id="2" name="Title 1"/>
+          <p:cNvSpPr>
+            <a:spLocks noGrp="1"/>
+          </p:cNvSpPr>
+          <p:nvPr>
+            <p:ph type="title"/>
+          </p:nvPr>
+        </p:nvSpPr>
+        <p:spPr/>
+        <p:txBody>
+          <a:bodyPr/>
+          <a:lstStyle/>
+          <a:p>
+            <a:r>
+              <a:rPr lang="en-US" dirty="0" smtClean="0"/>
+              <a:t>Track </a:t>
+            </a:r>
+            <a:r>
+              <a:rPr lang="en-US" dirty="0" smtClean="0"/>
+              <a:t>Model: Class Diagram</a:t>
+            </a:r>
+            <a:endParaRPr lang="en-US" dirty="0"/>
+          </a:p>
+        </p:txBody>
+      </p:sp>
+      <p:pic>
+        <p:nvPicPr>
+          <p:cNvPr id="4" name="Content Placeholder 3"/>
+          <p:cNvPicPr>
+            <a:picLocks noGrp="1" noChangeAspect="1"/>
+          </p:cNvPicPr>
+          <p:nvPr>
+            <p:ph idx="1"/>
+          </p:nvPr>
+        </p:nvPicPr>
+        <p:blipFill>
+          <a:blip r:embed="rId2">
+            <a:extLst>
+              <a:ext uri="{28A0092B-C50C-407E-A947-70E740481C1C}">
+                <a14:useLocalDpi xmlns:a14="http://schemas.microsoft.com/office/drawing/2010/main" val="0"/>
+              </a:ext>
+            </a:extLst>
+          </a:blip>
+          <a:stretch>
+            <a:fillRect/>
+          </a:stretch>
+        </p:blipFill>
+        <p:spPr>
+          <a:xfrm>
+            <a:off x="457200" y="1661827"/>
+            <a:ext cx="7620000" cy="4677345"/>
+          </a:xfrm>
+        </p:spPr>
+      </p:pic>
     </p:spTree>
     <p:extLst>
       <p:ext uri="{BB962C8B-B14F-4D97-AF65-F5344CB8AC3E}">
         <p14:creationId xmlns:p14="http://schemas.microsoft.com/office/powerpoint/2010/main" val="2371159061"/>
+      </p:ext>
+    </p:extLst>
+  </p:cSld>
+  <p:clrMapOvr>
+    <a:masterClrMapping/>
+  </p:clrMapOvr>
+</p:sld>
+</file>
+
+<file path=ppt/slides/slide19.xml><?xml version="1.0" encoding="utf-8"?>
+<p:sld xmlns:a="http://schemas.openxmlformats.org/drawingml/2006/main" xmlns:r="http://schemas.openxmlformats.org/officeDocument/2006/relationships" xmlns:p="http://schemas.openxmlformats.org/presentationml/2006/main">
+  <p:cSld>
+    <p:spTree>
+      <p:nvGrpSpPr>
+        <p:cNvPr id="1" name=""/>
+        <p:cNvGrpSpPr/>
+        <p:nvPr/>
+      </p:nvGrpSpPr>
+      <p:grpSpPr>
+        <a:xfrm>
+          <a:off x="0" y="0"/>
+          <a:ext cx="0" cy="0"/>
+          <a:chOff x="0" y="0"/>
+          <a:chExt cx="0" cy="0"/>
+        </a:xfrm>
+      </p:grpSpPr>
+      <p:sp>
+        <p:nvSpPr>
+          <p:cNvPr id="2" name="Title 1"/>
+          <p:cNvSpPr>
+            <a:spLocks noGrp="1"/>
+          </p:cNvSpPr>
+          <p:nvPr>
+            <p:ph type="title"/>
+          </p:nvPr>
+        </p:nvSpPr>
+        <p:spPr/>
+        <p:txBody>
+          <a:bodyPr/>
+          <a:lstStyle/>
+          <a:p>
+            <a:pPr algn="ctr"/>
+            <a:r>
+              <a:rPr lang="en-US" dirty="0" smtClean="0"/>
+              <a:t>Track Model: Sequence Diagram</a:t>
+            </a:r>
+            <a:endParaRPr lang="en-US" dirty="0"/>
+          </a:p>
+        </p:txBody>
+      </p:sp>
+      <p:pic>
+        <p:nvPicPr>
+          <p:cNvPr id="4" name="Content Placeholder 3"/>
+          <p:cNvPicPr>
+            <a:picLocks noGrp="1" noChangeAspect="1"/>
+          </p:cNvPicPr>
+          <p:nvPr>
+            <p:ph idx="1"/>
+          </p:nvPr>
+        </p:nvPicPr>
+        <p:blipFill>
+          <a:blip r:embed="rId2">
+            <a:extLst>
+              <a:ext uri="{28A0092B-C50C-407E-A947-70E740481C1C}">
+                <a14:useLocalDpi xmlns:a14="http://schemas.microsoft.com/office/drawing/2010/main" val="0"/>
+              </a:ext>
+            </a:extLst>
+          </a:blip>
+          <a:stretch>
+            <a:fillRect/>
+          </a:stretch>
+        </p:blipFill>
+        <p:spPr>
+          <a:xfrm>
+            <a:off x="-27709" y="1524000"/>
+            <a:ext cx="8775699" cy="4876799"/>
+          </a:xfrm>
+        </p:spPr>
+      </p:pic>
+    </p:spTree>
+    <p:extLst>
+      <p:ext uri="{BB962C8B-B14F-4D97-AF65-F5344CB8AC3E}">
+        <p14:creationId xmlns:p14="http://schemas.microsoft.com/office/powerpoint/2010/main" val="2725973674"/>
       </p:ext>
     </p:extLst>
   </p:cSld>
@@ -4776,7 +4988,6 @@
               <a:rPr lang="en-US" dirty="0" smtClean="0"/>
               <a:t>.</a:t>
             </a:r>
-            <a:endParaRPr lang="en-US" dirty="0" smtClean="0"/>
           </a:p>
           <a:p>
             <a:pPr lvl="1"/>
@@ -4784,7 +4995,6 @@
               <a:rPr lang="en-US" dirty="0" smtClean="0"/>
               <a:t>Displays information about next stop</a:t>
             </a:r>
-            <a:endParaRPr lang="en-US" dirty="0" smtClean="0"/>
           </a:p>
           <a:p>
             <a:pPr lvl="1"/>

</xml_diff>

<commit_message>
added MBO use cases and class diagrams.
</commit_message>
<xml_diff>
--- a/Design Review/DesignReview.pptx
+++ b/Design Review/DesignReview.pptx
@@ -10,9 +10,9 @@
     <p:sldId id="258" r:id="rId4"/>
     <p:sldId id="259" r:id="rId5"/>
     <p:sldId id="264" r:id="rId6"/>
-    <p:sldId id="265" r:id="rId7"/>
-    <p:sldId id="266" r:id="rId8"/>
-    <p:sldId id="267" r:id="rId9"/>
+    <p:sldId id="267" r:id="rId7"/>
+    <p:sldId id="265" r:id="rId8"/>
+    <p:sldId id="266" r:id="rId9"/>
     <p:sldId id="272" r:id="rId10"/>
     <p:sldId id="260" r:id="rId11"/>
     <p:sldId id="270" r:id="rId12"/>
@@ -4624,7 +4624,15 @@
             <a:pPr lvl="1"/>
             <a:r>
               <a:rPr lang="en-US" dirty="0" smtClean="0"/>
-              <a:t>Calculate the safe Moving Block speed and authority for each train.</a:t>
+              <a:t>Calculate the safe </a:t>
+            </a:r>
+            <a:r>
+              <a:rPr lang="en-US" dirty="0" smtClean="0"/>
+              <a:t>stopping distance and Moving </a:t>
+            </a:r>
+            <a:r>
+              <a:rPr lang="en-US" dirty="0" smtClean="0"/>
+              <a:t>Block speed and authority for each train.</a:t>
             </a:r>
           </a:p>
           <a:p>
@@ -4729,25 +4737,35 @@
           </a:p>
         </p:txBody>
       </p:sp>
-      <p:sp>
-        <p:nvSpPr>
-          <p:cNvPr id="3" name="Content Placeholder 2"/>
-          <p:cNvSpPr>
-            <a:spLocks noGrp="1"/>
-          </p:cNvSpPr>
+      <p:pic>
+        <p:nvPicPr>
+          <p:cNvPr id="4" name="Content Placeholder 3"/>
+          <p:cNvPicPr>
+            <a:picLocks noGrp="1" noChangeAspect="1"/>
+          </p:cNvPicPr>
           <p:nvPr>
             <p:ph idx="1"/>
           </p:nvPr>
-        </p:nvSpPr>
-        <p:spPr/>
-        <p:txBody>
-          <a:bodyPr/>
-          <a:lstStyle/>
-          <a:p>
-            <a:endParaRPr lang="en-US"/>
-          </a:p>
-        </p:txBody>
-      </p:sp>
+        </p:nvPicPr>
+        <p:blipFill>
+          <a:blip r:embed="rId2">
+            <a:extLst>
+              <a:ext uri="{28A0092B-C50C-407E-A947-70E740481C1C}">
+                <a14:useLocalDpi xmlns:a14="http://schemas.microsoft.com/office/drawing/2010/main" val="0"/>
+              </a:ext>
+            </a:extLst>
+          </a:blip>
+          <a:stretch>
+            <a:fillRect/>
+          </a:stretch>
+        </p:blipFill>
+        <p:spPr>
+          <a:xfrm>
+            <a:off x="1192409" y="1600200"/>
+            <a:ext cx="6149581" cy="4800600"/>
+          </a:xfrm>
+        </p:spPr>
+      </p:pic>
     </p:spTree>
     <p:extLst>
       <p:ext uri="{BB962C8B-B14F-4D97-AF65-F5344CB8AC3E}">
@@ -4802,35 +4820,45 @@
           <a:p>
             <a:r>
               <a:rPr lang="en-US" dirty="0" smtClean="0"/>
-              <a:t>MBO Sequence Diagram</a:t>
+              <a:t>MBO Class Diagram</a:t>
             </a:r>
             <a:endParaRPr lang="en-US" dirty="0"/>
           </a:p>
         </p:txBody>
       </p:sp>
-      <p:sp>
-        <p:nvSpPr>
-          <p:cNvPr id="3" name="Content Placeholder 2"/>
-          <p:cNvSpPr>
-            <a:spLocks noGrp="1"/>
-          </p:cNvSpPr>
+      <p:pic>
+        <p:nvPicPr>
+          <p:cNvPr id="6" name="Content Placeholder 5"/>
+          <p:cNvPicPr>
+            <a:picLocks noGrp="1" noChangeAspect="1"/>
+          </p:cNvPicPr>
           <p:nvPr>
             <p:ph idx="1"/>
           </p:nvPr>
-        </p:nvSpPr>
-        <p:spPr/>
-        <p:txBody>
-          <a:bodyPr/>
-          <a:lstStyle/>
-          <a:p>
-            <a:endParaRPr lang="en-US"/>
-          </a:p>
-        </p:txBody>
-      </p:sp>
+        </p:nvPicPr>
+        <p:blipFill>
+          <a:blip r:embed="rId2">
+            <a:extLst>
+              <a:ext uri="{28A0092B-C50C-407E-A947-70E740481C1C}">
+                <a14:useLocalDpi xmlns:a14="http://schemas.microsoft.com/office/drawing/2010/main" val="0"/>
+              </a:ext>
+            </a:extLst>
+          </a:blip>
+          <a:stretch>
+            <a:fillRect/>
+          </a:stretch>
+        </p:blipFill>
+        <p:spPr>
+          <a:xfrm>
+            <a:off x="1522689" y="1600200"/>
+            <a:ext cx="5489022" cy="4800600"/>
+          </a:xfrm>
+        </p:spPr>
+      </p:pic>
     </p:spTree>
     <p:extLst>
       <p:ext uri="{BB962C8B-B14F-4D97-AF65-F5344CB8AC3E}">
-        <p14:creationId xmlns:p14="http://schemas.microsoft.com/office/powerpoint/2010/main" val="3683466190"/>
+        <p14:creationId xmlns:p14="http://schemas.microsoft.com/office/powerpoint/2010/main" val="2575964444"/>
       </p:ext>
     </p:extLst>
   </p:cSld>
@@ -4881,7 +4909,7 @@
           <a:p>
             <a:r>
               <a:rPr lang="en-US" dirty="0" smtClean="0"/>
-              <a:t>MBO Activity Diagram (only for modules with algorithms)</a:t>
+              <a:t>MBO Sequence Diagram</a:t>
             </a:r>
             <a:endParaRPr lang="en-US" dirty="0"/>
           </a:p>
@@ -4909,7 +4937,7 @@
     </p:spTree>
     <p:extLst>
       <p:ext uri="{BB962C8B-B14F-4D97-AF65-F5344CB8AC3E}">
-        <p14:creationId xmlns:p14="http://schemas.microsoft.com/office/powerpoint/2010/main" val="2251097469"/>
+        <p14:creationId xmlns:p14="http://schemas.microsoft.com/office/powerpoint/2010/main" val="3683466190"/>
       </p:ext>
     </p:extLst>
   </p:cSld>
@@ -4960,7 +4988,7 @@
           <a:p>
             <a:r>
               <a:rPr lang="en-US" dirty="0" smtClean="0"/>
-              <a:t>MBO Class Diagram</a:t>
+              <a:t>MBO Activity Diagram (only for modules with algorithms)</a:t>
             </a:r>
             <a:endParaRPr lang="en-US" dirty="0"/>
           </a:p>
@@ -4988,7 +5016,7 @@
     </p:spTree>
     <p:extLst>
       <p:ext uri="{BB962C8B-B14F-4D97-AF65-F5344CB8AC3E}">
-        <p14:creationId xmlns:p14="http://schemas.microsoft.com/office/powerpoint/2010/main" val="2575964444"/>
+        <p14:creationId xmlns:p14="http://schemas.microsoft.com/office/powerpoint/2010/main" val="2251097469"/>
       </p:ext>
     </p:extLst>
   </p:cSld>

</xml_diff>

<commit_message>
updated ppt with CTC stuff
</commit_message>
<xml_diff>
--- a/Design Review/DesignReview.pptx
+++ b/Design Review/DesignReview.pptx
@@ -8,23 +8,26 @@
     <p:sldId id="256" r:id="rId2"/>
     <p:sldId id="257" r:id="rId3"/>
     <p:sldId id="258" r:id="rId4"/>
-    <p:sldId id="259" r:id="rId5"/>
-    <p:sldId id="264" r:id="rId6"/>
-    <p:sldId id="267" r:id="rId7"/>
-    <p:sldId id="265" r:id="rId8"/>
-    <p:sldId id="266" r:id="rId9"/>
-    <p:sldId id="272" r:id="rId10"/>
-    <p:sldId id="260" r:id="rId11"/>
-    <p:sldId id="270" r:id="rId12"/>
-    <p:sldId id="271" r:id="rId13"/>
-    <p:sldId id="263" r:id="rId14"/>
-    <p:sldId id="275" r:id="rId15"/>
-    <p:sldId id="261" r:id="rId16"/>
-    <p:sldId id="268" r:id="rId17"/>
-    <p:sldId id="269" r:id="rId18"/>
-    <p:sldId id="274" r:id="rId19"/>
-    <p:sldId id="262" r:id="rId20"/>
-    <p:sldId id="273" r:id="rId21"/>
+    <p:sldId id="276" r:id="rId5"/>
+    <p:sldId id="277" r:id="rId6"/>
+    <p:sldId id="278" r:id="rId7"/>
+    <p:sldId id="259" r:id="rId8"/>
+    <p:sldId id="264" r:id="rId9"/>
+    <p:sldId id="267" r:id="rId10"/>
+    <p:sldId id="265" r:id="rId11"/>
+    <p:sldId id="266" r:id="rId12"/>
+    <p:sldId id="272" r:id="rId13"/>
+    <p:sldId id="260" r:id="rId14"/>
+    <p:sldId id="270" r:id="rId15"/>
+    <p:sldId id="271" r:id="rId16"/>
+    <p:sldId id="263" r:id="rId17"/>
+    <p:sldId id="275" r:id="rId18"/>
+    <p:sldId id="261" r:id="rId19"/>
+    <p:sldId id="268" r:id="rId20"/>
+    <p:sldId id="269" r:id="rId21"/>
+    <p:sldId id="274" r:id="rId22"/>
+    <p:sldId id="262" r:id="rId23"/>
+    <p:sldId id="273" r:id="rId24"/>
   </p:sldIdLst>
   <p:sldSz cx="9144000" cy="6858000" type="screen4x3"/>
   <p:notesSz cx="6858000" cy="9144000"/>
@@ -3340,6 +3343,303 @@
           <a:p>
             <a:r>
               <a:rPr lang="en-US" dirty="0" smtClean="0"/>
+              <a:t>MBO Sequence Diagram</a:t>
+            </a:r>
+            <a:endParaRPr lang="en-US" dirty="0"/>
+          </a:p>
+        </p:txBody>
+      </p:sp>
+      <p:sp>
+        <p:nvSpPr>
+          <p:cNvPr id="3" name="Content Placeholder 2"/>
+          <p:cNvSpPr>
+            <a:spLocks noGrp="1"/>
+          </p:cNvSpPr>
+          <p:nvPr>
+            <p:ph idx="1"/>
+          </p:nvPr>
+        </p:nvSpPr>
+        <p:spPr/>
+        <p:txBody>
+          <a:bodyPr/>
+          <a:lstStyle/>
+          <a:p>
+            <a:endParaRPr lang="en-US"/>
+          </a:p>
+        </p:txBody>
+      </p:sp>
+    </p:spTree>
+    <p:extLst>
+      <p:ext uri="{BB962C8B-B14F-4D97-AF65-F5344CB8AC3E}">
+        <p14:creationId xmlns:p14="http://schemas.microsoft.com/office/powerpoint/2010/main" val="3683466190"/>
+      </p:ext>
+    </p:extLst>
+  </p:cSld>
+  <p:clrMapOvr>
+    <a:masterClrMapping/>
+  </p:clrMapOvr>
+  <p:timing>
+    <p:tnLst>
+      <p:par>
+        <p:cTn id="1" dur="indefinite" restart="never" nodeType="tmRoot"/>
+      </p:par>
+    </p:tnLst>
+  </p:timing>
+</p:sld>
+</file>
+
+<file path=ppt/slides/slide11.xml><?xml version="1.0" encoding="utf-8"?>
+<p:sld xmlns:a="http://schemas.openxmlformats.org/drawingml/2006/main" xmlns:r="http://schemas.openxmlformats.org/officeDocument/2006/relationships" xmlns:p="http://schemas.openxmlformats.org/presentationml/2006/main">
+  <p:cSld>
+    <p:spTree>
+      <p:nvGrpSpPr>
+        <p:cNvPr id="1" name=""/>
+        <p:cNvGrpSpPr/>
+        <p:nvPr/>
+      </p:nvGrpSpPr>
+      <p:grpSpPr>
+        <a:xfrm>
+          <a:off x="0" y="0"/>
+          <a:ext cx="0" cy="0"/>
+          <a:chOff x="0" y="0"/>
+          <a:chExt cx="0" cy="0"/>
+        </a:xfrm>
+      </p:grpSpPr>
+      <p:sp>
+        <p:nvSpPr>
+          <p:cNvPr id="2" name="Title 1"/>
+          <p:cNvSpPr>
+            <a:spLocks noGrp="1"/>
+          </p:cNvSpPr>
+          <p:nvPr>
+            <p:ph type="title"/>
+          </p:nvPr>
+        </p:nvSpPr>
+        <p:spPr/>
+        <p:txBody>
+          <a:bodyPr/>
+          <a:lstStyle/>
+          <a:p>
+            <a:r>
+              <a:rPr lang="en-US" dirty="0" smtClean="0"/>
+              <a:t>MBO Activity Diagram (only for modules with algorithms)</a:t>
+            </a:r>
+            <a:endParaRPr lang="en-US" dirty="0"/>
+          </a:p>
+        </p:txBody>
+      </p:sp>
+      <p:sp>
+        <p:nvSpPr>
+          <p:cNvPr id="3" name="Content Placeholder 2"/>
+          <p:cNvSpPr>
+            <a:spLocks noGrp="1"/>
+          </p:cNvSpPr>
+          <p:nvPr>
+            <p:ph idx="1"/>
+          </p:nvPr>
+        </p:nvSpPr>
+        <p:spPr/>
+        <p:txBody>
+          <a:bodyPr/>
+          <a:lstStyle/>
+          <a:p>
+            <a:endParaRPr lang="en-US"/>
+          </a:p>
+        </p:txBody>
+      </p:sp>
+    </p:spTree>
+    <p:extLst>
+      <p:ext uri="{BB962C8B-B14F-4D97-AF65-F5344CB8AC3E}">
+        <p14:creationId xmlns:p14="http://schemas.microsoft.com/office/powerpoint/2010/main" val="2251097469"/>
+      </p:ext>
+    </p:extLst>
+  </p:cSld>
+  <p:clrMapOvr>
+    <a:masterClrMapping/>
+  </p:clrMapOvr>
+  <p:timing>
+    <p:tnLst>
+      <p:par>
+        <p:cTn id="1" dur="indefinite" restart="never" nodeType="tmRoot"/>
+      </p:par>
+    </p:tnLst>
+  </p:timing>
+</p:sld>
+</file>
+
+<file path=ppt/slides/slide12.xml><?xml version="1.0" encoding="utf-8"?>
+<p:sld xmlns:a="http://schemas.openxmlformats.org/drawingml/2006/main" xmlns:r="http://schemas.openxmlformats.org/officeDocument/2006/relationships" xmlns:p="http://schemas.openxmlformats.org/presentationml/2006/main">
+  <p:cSld>
+    <p:spTree>
+      <p:nvGrpSpPr>
+        <p:cNvPr id="1" name=""/>
+        <p:cNvGrpSpPr/>
+        <p:nvPr/>
+      </p:nvGrpSpPr>
+      <p:grpSpPr>
+        <a:xfrm>
+          <a:off x="0" y="0"/>
+          <a:ext cx="0" cy="0"/>
+          <a:chOff x="0" y="0"/>
+          <a:chExt cx="0" cy="0"/>
+        </a:xfrm>
+      </p:grpSpPr>
+      <p:sp>
+        <p:nvSpPr>
+          <p:cNvPr id="2" name="Title 1"/>
+          <p:cNvSpPr>
+            <a:spLocks noGrp="1"/>
+          </p:cNvSpPr>
+          <p:nvPr>
+            <p:ph type="title"/>
+          </p:nvPr>
+        </p:nvSpPr>
+        <p:spPr/>
+        <p:txBody>
+          <a:bodyPr/>
+          <a:lstStyle/>
+          <a:p>
+            <a:r>
+              <a:rPr lang="en-US" dirty="0" smtClean="0"/>
+              <a:t>Train Model</a:t>
+            </a:r>
+            <a:endParaRPr lang="en-US" dirty="0"/>
+          </a:p>
+        </p:txBody>
+      </p:sp>
+      <p:sp>
+        <p:nvSpPr>
+          <p:cNvPr id="3" name="Content Placeholder 2"/>
+          <p:cNvSpPr>
+            <a:spLocks noGrp="1"/>
+          </p:cNvSpPr>
+          <p:nvPr>
+            <p:ph idx="1"/>
+          </p:nvPr>
+        </p:nvSpPr>
+        <p:spPr/>
+        <p:txBody>
+          <a:bodyPr/>
+          <a:lstStyle/>
+          <a:p>
+            <a:r>
+              <a:rPr lang="en-US" dirty="0" smtClean="0"/>
+              <a:t>Purpose</a:t>
+            </a:r>
+          </a:p>
+          <a:p>
+            <a:pPr lvl="1"/>
+            <a:r>
+              <a:rPr lang="en-US" dirty="0" smtClean="0"/>
+              <a:t>Accepts input </a:t>
+            </a:r>
+            <a:r>
+              <a:rPr lang="en-US" dirty="0"/>
+              <a:t>regarding the </a:t>
+            </a:r>
+            <a:r>
+              <a:rPr lang="en-US" dirty="0" err="1"/>
+              <a:t>setpoint</a:t>
+            </a:r>
+            <a:r>
+              <a:rPr lang="en-US" dirty="0"/>
+              <a:t> </a:t>
+            </a:r>
+            <a:r>
+              <a:rPr lang="en-US" dirty="0" smtClean="0"/>
+              <a:t>power, </a:t>
+            </a:r>
+            <a:r>
+              <a:rPr lang="en-US" dirty="0"/>
+              <a:t>brake command, speed limit, acceleration limit, deceleration limit, route information, temperature control, door open, door close, transponder input, track circuit input, and light controller for tunnel</a:t>
+            </a:r>
+            <a:r>
+              <a:rPr lang="en-US" dirty="0" smtClean="0"/>
+              <a:t>.</a:t>
+            </a:r>
+          </a:p>
+          <a:p>
+            <a:pPr lvl="1"/>
+            <a:r>
+              <a:rPr lang="en-US" dirty="0"/>
+              <a:t>Calculates the speed of the train based upon power input</a:t>
+            </a:r>
+            <a:r>
+              <a:rPr lang="en-US" dirty="0" smtClean="0"/>
+              <a:t>.</a:t>
+            </a:r>
+          </a:p>
+          <a:p>
+            <a:pPr lvl="1"/>
+            <a:r>
+              <a:rPr lang="en-US" dirty="0" smtClean="0"/>
+              <a:t>Displays information about next stop</a:t>
+            </a:r>
+          </a:p>
+          <a:p>
+            <a:pPr lvl="1"/>
+            <a:r>
+              <a:rPr lang="en-US" dirty="0" smtClean="0"/>
+              <a:t>Simulates train failures</a:t>
+            </a:r>
+            <a:endParaRPr lang="en-US" dirty="0"/>
+          </a:p>
+        </p:txBody>
+      </p:sp>
+    </p:spTree>
+    <p:extLst>
+      <p:ext uri="{BB962C8B-B14F-4D97-AF65-F5344CB8AC3E}">
+        <p14:creationId xmlns:p14="http://schemas.microsoft.com/office/powerpoint/2010/main" val="121172839"/>
+      </p:ext>
+    </p:extLst>
+  </p:cSld>
+  <p:clrMapOvr>
+    <a:masterClrMapping/>
+  </p:clrMapOvr>
+  <p:timing>
+    <p:tnLst>
+      <p:par>
+        <p:cTn id="1" dur="indefinite" restart="never" nodeType="tmRoot"/>
+      </p:par>
+    </p:tnLst>
+  </p:timing>
+</p:sld>
+</file>
+
+<file path=ppt/slides/slide13.xml><?xml version="1.0" encoding="utf-8"?>
+<p:sld xmlns:a="http://schemas.openxmlformats.org/drawingml/2006/main" xmlns:r="http://schemas.openxmlformats.org/officeDocument/2006/relationships" xmlns:p="http://schemas.openxmlformats.org/presentationml/2006/main">
+  <p:cSld>
+    <p:spTree>
+      <p:nvGrpSpPr>
+        <p:cNvPr id="1" name=""/>
+        <p:cNvGrpSpPr/>
+        <p:nvPr/>
+      </p:nvGrpSpPr>
+      <p:grpSpPr>
+        <a:xfrm>
+          <a:off x="0" y="0"/>
+          <a:ext cx="0" cy="0"/>
+          <a:chOff x="0" y="0"/>
+          <a:chExt cx="0" cy="0"/>
+        </a:xfrm>
+      </p:grpSpPr>
+      <p:sp>
+        <p:nvSpPr>
+          <p:cNvPr id="2" name="Title 1"/>
+          <p:cNvSpPr>
+            <a:spLocks noGrp="1"/>
+          </p:cNvSpPr>
+          <p:nvPr>
+            <p:ph type="title"/>
+          </p:nvPr>
+        </p:nvSpPr>
+        <p:spPr/>
+        <p:txBody>
+          <a:bodyPr/>
+          <a:lstStyle/>
+          <a:p>
+            <a:r>
+              <a:rPr lang="en-US" dirty="0" smtClean="0"/>
               <a:t>Train Model/Controller: </a:t>
             </a:r>
             <a:r>
@@ -3398,7 +3698,7 @@
 </p:sld>
 </file>
 
-<file path=ppt/slides/slide11.xml><?xml version="1.0" encoding="utf-8"?>
+<file path=ppt/slides/slide14.xml><?xml version="1.0" encoding="utf-8"?>
 <p:sld xmlns:a="http://schemas.openxmlformats.org/drawingml/2006/main" xmlns:r="http://schemas.openxmlformats.org/officeDocument/2006/relationships" xmlns:p="http://schemas.openxmlformats.org/presentationml/2006/main">
   <p:cSld>
     <p:spTree>
@@ -3487,7 +3787,7 @@
 </p:sld>
 </file>
 
-<file path=ppt/slides/slide12.xml><?xml version="1.0" encoding="utf-8"?>
+<file path=ppt/slides/slide15.xml><?xml version="1.0" encoding="utf-8"?>
 <p:sld xmlns:a="http://schemas.openxmlformats.org/drawingml/2006/main" xmlns:r="http://schemas.openxmlformats.org/officeDocument/2006/relationships" xmlns:p="http://schemas.openxmlformats.org/presentationml/2006/main">
   <p:cSld>
     <p:spTree>
@@ -3579,7 +3879,7 @@
 </p:sld>
 </file>
 
-<file path=ppt/slides/slide13.xml><?xml version="1.0" encoding="utf-8"?>
+<file path=ppt/slides/slide16.xml><?xml version="1.0" encoding="utf-8"?>
 <p:sld xmlns:a="http://schemas.openxmlformats.org/drawingml/2006/main" xmlns:r="http://schemas.openxmlformats.org/officeDocument/2006/relationships" xmlns:p="http://schemas.openxmlformats.org/presentationml/2006/main">
   <p:cSld>
     <p:spTree>
@@ -3662,7 +3962,7 @@
 </p:sld>
 </file>
 
-<file path=ppt/slides/slide14.xml><?xml version="1.0" encoding="utf-8"?>
+<file path=ppt/slides/slide17.xml><?xml version="1.0" encoding="utf-8"?>
 <p:sld xmlns:a="http://schemas.openxmlformats.org/drawingml/2006/main" xmlns:r="http://schemas.openxmlformats.org/officeDocument/2006/relationships" xmlns:p="http://schemas.openxmlformats.org/presentationml/2006/main">
   <p:cSld>
     <p:spTree>
@@ -3794,7 +4094,7 @@
 </p:sld>
 </file>
 
-<file path=ppt/slides/slide15.xml><?xml version="1.0" encoding="utf-8"?>
+<file path=ppt/slides/slide18.xml><?xml version="1.0" encoding="utf-8"?>
 <p:sld xmlns:a="http://schemas.openxmlformats.org/drawingml/2006/main" xmlns:r="http://schemas.openxmlformats.org/officeDocument/2006/relationships" xmlns:p="http://schemas.openxmlformats.org/presentationml/2006/main">
   <p:cSld>
     <p:spTree>
@@ -3892,7 +4192,7 @@
 </p:sld>
 </file>
 
-<file path=ppt/slides/slide16.xml><?xml version="1.0" encoding="utf-8"?>
+<file path=ppt/slides/slide19.xml><?xml version="1.0" encoding="utf-8"?>
 <p:sld xmlns:a="http://schemas.openxmlformats.org/drawingml/2006/main" xmlns:r="http://schemas.openxmlformats.org/officeDocument/2006/relationships" xmlns:p="http://schemas.openxmlformats.org/presentationml/2006/main">
   <p:cSld>
     <p:spTree>
@@ -4001,7 +4301,86 @@
 </p:sld>
 </file>
 
-<file path=ppt/slides/slide17.xml><?xml version="1.0" encoding="utf-8"?>
+<file path=ppt/slides/slide2.xml><?xml version="1.0" encoding="utf-8"?>
+<p:sld xmlns:a="http://schemas.openxmlformats.org/drawingml/2006/main" xmlns:r="http://schemas.openxmlformats.org/officeDocument/2006/relationships" xmlns:p="http://schemas.openxmlformats.org/presentationml/2006/main">
+  <p:cSld>
+    <p:spTree>
+      <p:nvGrpSpPr>
+        <p:cNvPr id="1" name=""/>
+        <p:cNvGrpSpPr/>
+        <p:nvPr/>
+      </p:nvGrpSpPr>
+      <p:grpSpPr>
+        <a:xfrm>
+          <a:off x="0" y="0"/>
+          <a:ext cx="0" cy="0"/>
+          <a:chOff x="0" y="0"/>
+          <a:chExt cx="0" cy="0"/>
+        </a:xfrm>
+      </p:grpSpPr>
+      <p:sp>
+        <p:nvSpPr>
+          <p:cNvPr id="2" name="Title 1"/>
+          <p:cNvSpPr>
+            <a:spLocks noGrp="1"/>
+          </p:cNvSpPr>
+          <p:nvPr>
+            <p:ph type="title"/>
+          </p:nvPr>
+        </p:nvSpPr>
+        <p:spPr/>
+        <p:txBody>
+          <a:bodyPr/>
+          <a:lstStyle/>
+          <a:p>
+            <a:r>
+              <a:rPr lang="en-US" dirty="0" smtClean="0"/>
+              <a:t>System Overview</a:t>
+            </a:r>
+            <a:endParaRPr lang="en-US" dirty="0"/>
+          </a:p>
+        </p:txBody>
+      </p:sp>
+      <p:sp>
+        <p:nvSpPr>
+          <p:cNvPr id="3" name="Content Placeholder 2"/>
+          <p:cNvSpPr>
+            <a:spLocks noGrp="1"/>
+          </p:cNvSpPr>
+          <p:nvPr>
+            <p:ph idx="1"/>
+          </p:nvPr>
+        </p:nvSpPr>
+        <p:spPr/>
+        <p:txBody>
+          <a:bodyPr/>
+          <a:lstStyle/>
+          <a:p>
+            <a:endParaRPr lang="en-US"/>
+          </a:p>
+        </p:txBody>
+      </p:sp>
+    </p:spTree>
+    <p:extLst>
+      <p:ext uri="{BB962C8B-B14F-4D97-AF65-F5344CB8AC3E}">
+        <p14:creationId xmlns:p14="http://schemas.microsoft.com/office/powerpoint/2010/main" val="4068117127"/>
+      </p:ext>
+    </p:extLst>
+  </p:cSld>
+  <p:clrMapOvr>
+    <a:masterClrMapping/>
+  </p:clrMapOvr>
+  <p:timing>
+    <p:tnLst>
+      <p:par>
+        <p:cTn id="1" dur="indefinite" restart="never" nodeType="tmRoot"/>
+      </p:par>
+    </p:tnLst>
+  </p:timing>
+</p:sld>
+</file>
+
+<file path=ppt/slides/slide20.xml><?xml version="1.0" encoding="utf-8"?>
 <p:sld xmlns:a="http://schemas.openxmlformats.org/drawingml/2006/main" xmlns:r="http://schemas.openxmlformats.org/officeDocument/2006/relationships" xmlns:p="http://schemas.openxmlformats.org/presentationml/2006/main">
   <p:cSld>
     <p:spTree>
@@ -4114,7 +4493,7 @@
 </p:sld>
 </file>
 
-<file path=ppt/slides/slide18.xml><?xml version="1.0" encoding="utf-8"?>
+<file path=ppt/slides/slide21.xml><?xml version="1.0" encoding="utf-8"?>
 <p:sld xmlns:a="http://schemas.openxmlformats.org/drawingml/2006/main" xmlns:r="http://schemas.openxmlformats.org/officeDocument/2006/relationships" xmlns:p="http://schemas.openxmlformats.org/presentationml/2006/main">
   <p:cSld>
     <p:spTree>
@@ -4237,7 +4616,7 @@
 </p:sld>
 </file>
 
-<file path=ppt/slides/slide19.xml><?xml version="1.0" encoding="utf-8"?>
+<file path=ppt/slides/slide22.xml><?xml version="1.0" encoding="utf-8"?>
 <p:sld xmlns:a="http://schemas.openxmlformats.org/drawingml/2006/main" xmlns:r="http://schemas.openxmlformats.org/officeDocument/2006/relationships" xmlns:p="http://schemas.openxmlformats.org/presentationml/2006/main">
   <p:cSld>
     <p:spTree>
@@ -4319,86 +4698,7 @@
 </p:sld>
 </file>
 
-<file path=ppt/slides/slide2.xml><?xml version="1.0" encoding="utf-8"?>
-<p:sld xmlns:a="http://schemas.openxmlformats.org/drawingml/2006/main" xmlns:r="http://schemas.openxmlformats.org/officeDocument/2006/relationships" xmlns:p="http://schemas.openxmlformats.org/presentationml/2006/main">
-  <p:cSld>
-    <p:spTree>
-      <p:nvGrpSpPr>
-        <p:cNvPr id="1" name=""/>
-        <p:cNvGrpSpPr/>
-        <p:nvPr/>
-      </p:nvGrpSpPr>
-      <p:grpSpPr>
-        <a:xfrm>
-          <a:off x="0" y="0"/>
-          <a:ext cx="0" cy="0"/>
-          <a:chOff x="0" y="0"/>
-          <a:chExt cx="0" cy="0"/>
-        </a:xfrm>
-      </p:grpSpPr>
-      <p:sp>
-        <p:nvSpPr>
-          <p:cNvPr id="2" name="Title 1"/>
-          <p:cNvSpPr>
-            <a:spLocks noGrp="1"/>
-          </p:cNvSpPr>
-          <p:nvPr>
-            <p:ph type="title"/>
-          </p:nvPr>
-        </p:nvSpPr>
-        <p:spPr/>
-        <p:txBody>
-          <a:bodyPr/>
-          <a:lstStyle/>
-          <a:p>
-            <a:r>
-              <a:rPr lang="en-US" dirty="0" smtClean="0"/>
-              <a:t>System Overview</a:t>
-            </a:r>
-            <a:endParaRPr lang="en-US" dirty="0"/>
-          </a:p>
-        </p:txBody>
-      </p:sp>
-      <p:sp>
-        <p:nvSpPr>
-          <p:cNvPr id="3" name="Content Placeholder 2"/>
-          <p:cNvSpPr>
-            <a:spLocks noGrp="1"/>
-          </p:cNvSpPr>
-          <p:nvPr>
-            <p:ph idx="1"/>
-          </p:nvPr>
-        </p:nvSpPr>
-        <p:spPr/>
-        <p:txBody>
-          <a:bodyPr/>
-          <a:lstStyle/>
-          <a:p>
-            <a:endParaRPr lang="en-US"/>
-          </a:p>
-        </p:txBody>
-      </p:sp>
-    </p:spTree>
-    <p:extLst>
-      <p:ext uri="{BB962C8B-B14F-4D97-AF65-F5344CB8AC3E}">
-        <p14:creationId xmlns:p14="http://schemas.microsoft.com/office/powerpoint/2010/main" val="4068117127"/>
-      </p:ext>
-    </p:extLst>
-  </p:cSld>
-  <p:clrMapOvr>
-    <a:masterClrMapping/>
-  </p:clrMapOvr>
-  <p:timing>
-    <p:tnLst>
-      <p:par>
-        <p:cTn id="1" dur="indefinite" restart="never" nodeType="tmRoot"/>
-      </p:par>
-    </p:tnLst>
-  </p:timing>
-</p:sld>
-</file>
-
-<file path=ppt/slides/slide20.xml><?xml version="1.0" encoding="utf-8"?>
+<file path=ppt/slides/slide23.xml><?xml version="1.0" encoding="utf-8"?>
 <p:sld xmlns:a="http://schemas.openxmlformats.org/drawingml/2006/main" xmlns:r="http://schemas.openxmlformats.org/officeDocument/2006/relationships" xmlns:p="http://schemas.openxmlformats.org/presentationml/2006/main">
   <p:cSld>
     <p:spTree>
@@ -4508,38 +4808,69 @@
             <p:ph type="title"/>
           </p:nvPr>
         </p:nvSpPr>
-        <p:spPr/>
+        <p:spPr>
+          <a:xfrm>
+            <a:off x="0" y="-5395"/>
+            <a:ext cx="7620000" cy="1143000"/>
+          </a:xfrm>
+        </p:spPr>
         <p:txBody>
           <a:bodyPr/>
           <a:lstStyle/>
           <a:p>
             <a:r>
               <a:rPr lang="en-US" dirty="0" smtClean="0"/>
-              <a:t>CTC Office</a:t>
+              <a:t>CTC </a:t>
+            </a:r>
+            <a:r>
+              <a:rPr lang="en-US" dirty="0" smtClean="0"/>
+              <a:t>Office Use Cases</a:t>
             </a:r>
             <a:endParaRPr lang="en-US" dirty="0"/>
           </a:p>
         </p:txBody>
       </p:sp>
-      <p:sp>
-        <p:nvSpPr>
-          <p:cNvPr id="3" name="Content Placeholder 2"/>
-          <p:cNvSpPr>
-            <a:spLocks noGrp="1"/>
-          </p:cNvSpPr>
-          <p:nvPr>
-            <p:ph idx="1"/>
-          </p:nvPr>
-        </p:nvSpPr>
-        <p:spPr/>
-        <p:txBody>
-          <a:bodyPr/>
-          <a:lstStyle/>
-          <a:p>
-            <a:endParaRPr lang="en-US"/>
-          </a:p>
-        </p:txBody>
-      </p:sp>
+      <p:pic>
+        <p:nvPicPr>
+          <p:cNvPr id="1026" name="Picture 2" descr="C:\Users\coelabs\Documents\GitHub\COE1186\CTCUseCases.png"/>
+          <p:cNvPicPr>
+            <a:picLocks noChangeAspect="1" noChangeArrowheads="1"/>
+          </p:cNvPicPr>
+          <p:nvPr/>
+        </p:nvPicPr>
+        <p:blipFill>
+          <a:blip r:embed="rId2">
+            <a:extLst>
+              <a:ext uri="{28A0092B-C50C-407E-A947-70E740481C1C}">
+                <a14:useLocalDpi xmlns:a14="http://schemas.microsoft.com/office/drawing/2010/main" val="0"/>
+              </a:ext>
+            </a:extLst>
+          </a:blip>
+          <a:srcRect/>
+          <a:stretch>
+            <a:fillRect/>
+          </a:stretch>
+        </p:blipFill>
+        <p:spPr bwMode="auto">
+          <a:xfrm>
+            <a:off x="1179051" y="533400"/>
+            <a:ext cx="6785895" cy="6781800"/>
+          </a:xfrm>
+          <a:prstGeom prst="rect">
+            <a:avLst/>
+          </a:prstGeom>
+          <a:noFill/>
+          <a:extLst>
+            <a:ext uri="{909E8E84-426E-40DD-AFC4-6F175D3DCCD1}">
+              <a14:hiddenFill xmlns:a14="http://schemas.microsoft.com/office/drawing/2010/main">
+                <a:solidFill>
+                  <a:srgbClr val="FFFFFF"/>
+                </a:solidFill>
+              </a14:hiddenFill>
+            </a:ext>
+          </a:extLst>
+        </p:spPr>
+      </p:pic>
     </p:spTree>
     <p:extLst>
       <p:ext uri="{BB962C8B-B14F-4D97-AF65-F5344CB8AC3E}">
@@ -4594,6 +4925,288 @@
           <a:p>
             <a:r>
               <a:rPr lang="en-US" dirty="0" smtClean="0"/>
+              <a:t>CTC – Login Sequence Diagram</a:t>
+            </a:r>
+            <a:endParaRPr lang="en-US" dirty="0"/>
+          </a:p>
+        </p:txBody>
+      </p:sp>
+      <p:pic>
+        <p:nvPicPr>
+          <p:cNvPr id="2050" name="Picture 2" descr="C:\Users\coelabs\Downloads\SequenceDiagram.png"/>
+          <p:cNvPicPr>
+            <a:picLocks noChangeAspect="1" noChangeArrowheads="1"/>
+          </p:cNvPicPr>
+          <p:nvPr/>
+        </p:nvPicPr>
+        <p:blipFill>
+          <a:blip r:embed="rId2">
+            <a:extLst>
+              <a:ext uri="{28A0092B-C50C-407E-A947-70E740481C1C}">
+                <a14:useLocalDpi xmlns:a14="http://schemas.microsoft.com/office/drawing/2010/main" val="0"/>
+              </a:ext>
+            </a:extLst>
+          </a:blip>
+          <a:srcRect/>
+          <a:stretch>
+            <a:fillRect/>
+          </a:stretch>
+        </p:blipFill>
+        <p:spPr bwMode="auto">
+          <a:xfrm>
+            <a:off x="-304800" y="1371600"/>
+            <a:ext cx="9144000" cy="4274324"/>
+          </a:xfrm>
+          <a:prstGeom prst="rect">
+            <a:avLst/>
+          </a:prstGeom>
+          <a:noFill/>
+          <a:extLst>
+            <a:ext uri="{909E8E84-426E-40DD-AFC4-6F175D3DCCD1}">
+              <a14:hiddenFill xmlns:a14="http://schemas.microsoft.com/office/drawing/2010/main">
+                <a:solidFill>
+                  <a:srgbClr val="FFFFFF"/>
+                </a:solidFill>
+              </a14:hiddenFill>
+            </a:ext>
+          </a:extLst>
+        </p:spPr>
+      </p:pic>
+    </p:spTree>
+    <p:extLst>
+      <p:ext uri="{BB962C8B-B14F-4D97-AF65-F5344CB8AC3E}">
+        <p14:creationId xmlns:p14="http://schemas.microsoft.com/office/powerpoint/2010/main" val="2131755215"/>
+      </p:ext>
+    </p:extLst>
+  </p:cSld>
+  <p:clrMapOvr>
+    <a:masterClrMapping/>
+  </p:clrMapOvr>
+</p:sld>
+</file>
+
+<file path=ppt/slides/slide5.xml><?xml version="1.0" encoding="utf-8"?>
+<p:sld xmlns:a="http://schemas.openxmlformats.org/drawingml/2006/main" xmlns:r="http://schemas.openxmlformats.org/officeDocument/2006/relationships" xmlns:p="http://schemas.openxmlformats.org/presentationml/2006/main">
+  <p:cSld>
+    <p:spTree>
+      <p:nvGrpSpPr>
+        <p:cNvPr id="1" name=""/>
+        <p:cNvGrpSpPr/>
+        <p:nvPr/>
+      </p:nvGrpSpPr>
+      <p:grpSpPr>
+        <a:xfrm>
+          <a:off x="0" y="0"/>
+          <a:ext cx="0" cy="0"/>
+          <a:chOff x="0" y="0"/>
+          <a:chExt cx="0" cy="0"/>
+        </a:xfrm>
+      </p:grpSpPr>
+      <p:sp>
+        <p:nvSpPr>
+          <p:cNvPr id="2" name="Title 1"/>
+          <p:cNvSpPr>
+            <a:spLocks noGrp="1"/>
+          </p:cNvSpPr>
+          <p:nvPr>
+            <p:ph type="title"/>
+          </p:nvPr>
+        </p:nvSpPr>
+        <p:spPr/>
+        <p:txBody>
+          <a:bodyPr/>
+          <a:lstStyle/>
+          <a:p>
+            <a:r>
+              <a:rPr lang="en-US" dirty="0" smtClean="0"/>
+              <a:t>CTC Add Track Sequence Diagram</a:t>
+            </a:r>
+            <a:endParaRPr lang="en-US" dirty="0"/>
+          </a:p>
+        </p:txBody>
+      </p:sp>
+      <p:pic>
+        <p:nvPicPr>
+          <p:cNvPr id="3074" name="Picture 2" descr="C:\Users\coelabs\Downloads\SequenceDiagram2.png"/>
+          <p:cNvPicPr>
+            <a:picLocks noChangeAspect="1" noChangeArrowheads="1"/>
+          </p:cNvPicPr>
+          <p:nvPr/>
+        </p:nvPicPr>
+        <p:blipFill>
+          <a:blip r:embed="rId2">
+            <a:extLst>
+              <a:ext uri="{28A0092B-C50C-407E-A947-70E740481C1C}">
+                <a14:useLocalDpi xmlns:a14="http://schemas.microsoft.com/office/drawing/2010/main" val="0"/>
+              </a:ext>
+            </a:extLst>
+          </a:blip>
+          <a:srcRect/>
+          <a:stretch>
+            <a:fillRect/>
+          </a:stretch>
+        </p:blipFill>
+        <p:spPr bwMode="auto">
+          <a:xfrm>
+            <a:off x="-1371600" y="1828800"/>
+            <a:ext cx="11528526" cy="6262902"/>
+          </a:xfrm>
+          <a:prstGeom prst="rect">
+            <a:avLst/>
+          </a:prstGeom>
+          <a:noFill/>
+          <a:extLst>
+            <a:ext uri="{909E8E84-426E-40DD-AFC4-6F175D3DCCD1}">
+              <a14:hiddenFill xmlns:a14="http://schemas.microsoft.com/office/drawing/2010/main">
+                <a:solidFill>
+                  <a:srgbClr val="FFFFFF"/>
+                </a:solidFill>
+              </a14:hiddenFill>
+            </a:ext>
+          </a:extLst>
+        </p:spPr>
+      </p:pic>
+    </p:spTree>
+    <p:extLst>
+      <p:ext uri="{BB962C8B-B14F-4D97-AF65-F5344CB8AC3E}">
+        <p14:creationId xmlns:p14="http://schemas.microsoft.com/office/powerpoint/2010/main" val="4199065397"/>
+      </p:ext>
+    </p:extLst>
+  </p:cSld>
+  <p:clrMapOvr>
+    <a:masterClrMapping/>
+  </p:clrMapOvr>
+</p:sld>
+</file>
+
+<file path=ppt/slides/slide6.xml><?xml version="1.0" encoding="utf-8"?>
+<p:sld xmlns:a="http://schemas.openxmlformats.org/drawingml/2006/main" xmlns:r="http://schemas.openxmlformats.org/officeDocument/2006/relationships" xmlns:p="http://schemas.openxmlformats.org/presentationml/2006/main">
+  <p:cSld>
+    <p:spTree>
+      <p:nvGrpSpPr>
+        <p:cNvPr id="1" name=""/>
+        <p:cNvGrpSpPr/>
+        <p:nvPr/>
+      </p:nvGrpSpPr>
+      <p:grpSpPr>
+        <a:xfrm>
+          <a:off x="0" y="0"/>
+          <a:ext cx="0" cy="0"/>
+          <a:chOff x="0" y="0"/>
+          <a:chExt cx="0" cy="0"/>
+        </a:xfrm>
+      </p:grpSpPr>
+      <p:sp>
+        <p:nvSpPr>
+          <p:cNvPr id="2" name="Title 1"/>
+          <p:cNvSpPr>
+            <a:spLocks noGrp="1"/>
+          </p:cNvSpPr>
+          <p:nvPr>
+            <p:ph type="title"/>
+          </p:nvPr>
+        </p:nvSpPr>
+        <p:spPr/>
+        <p:txBody>
+          <a:bodyPr/>
+          <a:lstStyle/>
+          <a:p>
+            <a:r>
+              <a:rPr lang="en-US" dirty="0" smtClean="0"/>
+              <a:t>CTC Class Diagram</a:t>
+            </a:r>
+            <a:endParaRPr lang="en-US" dirty="0"/>
+          </a:p>
+        </p:txBody>
+      </p:sp>
+      <p:pic>
+        <p:nvPicPr>
+          <p:cNvPr id="4098" name="Picture 2" descr="C:\Users\coelabs\Documents\GitHub\COE1186\ClassDiagram2.png"/>
+          <p:cNvPicPr>
+            <a:picLocks noChangeAspect="1" noChangeArrowheads="1"/>
+          </p:cNvPicPr>
+          <p:nvPr/>
+        </p:nvPicPr>
+        <p:blipFill>
+          <a:blip r:embed="rId2">
+            <a:extLst>
+              <a:ext uri="{28A0092B-C50C-407E-A947-70E740481C1C}">
+                <a14:useLocalDpi xmlns:a14="http://schemas.microsoft.com/office/drawing/2010/main" val="0"/>
+              </a:ext>
+            </a:extLst>
+          </a:blip>
+          <a:srcRect/>
+          <a:stretch>
+            <a:fillRect/>
+          </a:stretch>
+        </p:blipFill>
+        <p:spPr bwMode="auto">
+          <a:xfrm>
+            <a:off x="0" y="990600"/>
+            <a:ext cx="9144000" cy="5258853"/>
+          </a:xfrm>
+          <a:prstGeom prst="rect">
+            <a:avLst/>
+          </a:prstGeom>
+          <a:noFill/>
+          <a:extLst>
+            <a:ext uri="{909E8E84-426E-40DD-AFC4-6F175D3DCCD1}">
+              <a14:hiddenFill xmlns:a14="http://schemas.microsoft.com/office/drawing/2010/main">
+                <a:solidFill>
+                  <a:srgbClr val="FFFFFF"/>
+                </a:solidFill>
+              </a14:hiddenFill>
+            </a:ext>
+          </a:extLst>
+        </p:spPr>
+      </p:pic>
+    </p:spTree>
+    <p:extLst>
+      <p:ext uri="{BB962C8B-B14F-4D97-AF65-F5344CB8AC3E}">
+        <p14:creationId xmlns:p14="http://schemas.microsoft.com/office/powerpoint/2010/main" val="2754461296"/>
+      </p:ext>
+    </p:extLst>
+  </p:cSld>
+  <p:clrMapOvr>
+    <a:masterClrMapping/>
+  </p:clrMapOvr>
+</p:sld>
+</file>
+
+<file path=ppt/slides/slide7.xml><?xml version="1.0" encoding="utf-8"?>
+<p:sld xmlns:a="http://schemas.openxmlformats.org/drawingml/2006/main" xmlns:r="http://schemas.openxmlformats.org/officeDocument/2006/relationships" xmlns:p="http://schemas.openxmlformats.org/presentationml/2006/main">
+  <p:cSld>
+    <p:spTree>
+      <p:nvGrpSpPr>
+        <p:cNvPr id="1" name=""/>
+        <p:cNvGrpSpPr/>
+        <p:nvPr/>
+      </p:nvGrpSpPr>
+      <p:grpSpPr>
+        <a:xfrm>
+          <a:off x="0" y="0"/>
+          <a:ext cx="0" cy="0"/>
+          <a:chOff x="0" y="0"/>
+          <a:chExt cx="0" cy="0"/>
+        </a:xfrm>
+      </p:grpSpPr>
+      <p:sp>
+        <p:nvSpPr>
+          <p:cNvPr id="2" name="Title 1"/>
+          <p:cNvSpPr>
+            <a:spLocks noGrp="1"/>
+          </p:cNvSpPr>
+          <p:nvPr>
+            <p:ph type="title"/>
+          </p:nvPr>
+        </p:nvSpPr>
+        <p:spPr/>
+        <p:txBody>
+          <a:bodyPr/>
+          <a:lstStyle/>
+          <a:p>
+            <a:r>
+              <a:rPr lang="en-US" dirty="0" smtClean="0"/>
               <a:t>Moving Block Overlay</a:t>
             </a:r>
             <a:endParaRPr lang="en-US" dirty="0"/>
@@ -4624,15 +5237,7 @@
             <a:pPr lvl="1"/>
             <a:r>
               <a:rPr lang="en-US" dirty="0" smtClean="0"/>
-              <a:t>Calculate the safe </a:t>
-            </a:r>
-            <a:r>
-              <a:rPr lang="en-US" dirty="0" smtClean="0"/>
-              <a:t>stopping distance and Moving </a:t>
-            </a:r>
-            <a:r>
-              <a:rPr lang="en-US" dirty="0" smtClean="0"/>
-              <a:t>Block speed and authority for each train.</a:t>
+              <a:t>Calculate the safe stopping distance and Moving Block speed and authority for each train.</a:t>
             </a:r>
           </a:p>
           <a:p>
@@ -4697,7 +5302,7 @@
 </p:sld>
 </file>
 
-<file path=ppt/slides/slide5.xml><?xml version="1.0" encoding="utf-8"?>
+<file path=ppt/slides/slide8.xml><?xml version="1.0" encoding="utf-8"?>
 <p:sld xmlns:a="http://schemas.openxmlformats.org/drawingml/2006/main" xmlns:r="http://schemas.openxmlformats.org/officeDocument/2006/relationships" xmlns:p="http://schemas.openxmlformats.org/presentationml/2006/main">
   <p:cSld>
     <p:spTree>
@@ -4786,7 +5391,7 @@
 </p:sld>
 </file>
 
-<file path=ppt/slides/slide6.xml><?xml version="1.0" encoding="utf-8"?>
+<file path=ppt/slides/slide9.xml><?xml version="1.0" encoding="utf-8"?>
 <p:sld xmlns:a="http://schemas.openxmlformats.org/drawingml/2006/main" xmlns:r="http://schemas.openxmlformats.org/officeDocument/2006/relationships" xmlns:p="http://schemas.openxmlformats.org/presentationml/2006/main">
   <p:cSld>
     <p:spTree>
@@ -4859,303 +5464,6 @@
     <p:extLst>
       <p:ext uri="{BB962C8B-B14F-4D97-AF65-F5344CB8AC3E}">
         <p14:creationId xmlns:p14="http://schemas.microsoft.com/office/powerpoint/2010/main" val="2575964444"/>
-      </p:ext>
-    </p:extLst>
-  </p:cSld>
-  <p:clrMapOvr>
-    <a:masterClrMapping/>
-  </p:clrMapOvr>
-  <p:timing>
-    <p:tnLst>
-      <p:par>
-        <p:cTn id="1" dur="indefinite" restart="never" nodeType="tmRoot"/>
-      </p:par>
-    </p:tnLst>
-  </p:timing>
-</p:sld>
-</file>
-
-<file path=ppt/slides/slide7.xml><?xml version="1.0" encoding="utf-8"?>
-<p:sld xmlns:a="http://schemas.openxmlformats.org/drawingml/2006/main" xmlns:r="http://schemas.openxmlformats.org/officeDocument/2006/relationships" xmlns:p="http://schemas.openxmlformats.org/presentationml/2006/main">
-  <p:cSld>
-    <p:spTree>
-      <p:nvGrpSpPr>
-        <p:cNvPr id="1" name=""/>
-        <p:cNvGrpSpPr/>
-        <p:nvPr/>
-      </p:nvGrpSpPr>
-      <p:grpSpPr>
-        <a:xfrm>
-          <a:off x="0" y="0"/>
-          <a:ext cx="0" cy="0"/>
-          <a:chOff x="0" y="0"/>
-          <a:chExt cx="0" cy="0"/>
-        </a:xfrm>
-      </p:grpSpPr>
-      <p:sp>
-        <p:nvSpPr>
-          <p:cNvPr id="2" name="Title 1"/>
-          <p:cNvSpPr>
-            <a:spLocks noGrp="1"/>
-          </p:cNvSpPr>
-          <p:nvPr>
-            <p:ph type="title"/>
-          </p:nvPr>
-        </p:nvSpPr>
-        <p:spPr/>
-        <p:txBody>
-          <a:bodyPr/>
-          <a:lstStyle/>
-          <a:p>
-            <a:r>
-              <a:rPr lang="en-US" dirty="0" smtClean="0"/>
-              <a:t>MBO Sequence Diagram</a:t>
-            </a:r>
-            <a:endParaRPr lang="en-US" dirty="0"/>
-          </a:p>
-        </p:txBody>
-      </p:sp>
-      <p:sp>
-        <p:nvSpPr>
-          <p:cNvPr id="3" name="Content Placeholder 2"/>
-          <p:cNvSpPr>
-            <a:spLocks noGrp="1"/>
-          </p:cNvSpPr>
-          <p:nvPr>
-            <p:ph idx="1"/>
-          </p:nvPr>
-        </p:nvSpPr>
-        <p:spPr/>
-        <p:txBody>
-          <a:bodyPr/>
-          <a:lstStyle/>
-          <a:p>
-            <a:endParaRPr lang="en-US"/>
-          </a:p>
-        </p:txBody>
-      </p:sp>
-    </p:spTree>
-    <p:extLst>
-      <p:ext uri="{BB962C8B-B14F-4D97-AF65-F5344CB8AC3E}">
-        <p14:creationId xmlns:p14="http://schemas.microsoft.com/office/powerpoint/2010/main" val="3683466190"/>
-      </p:ext>
-    </p:extLst>
-  </p:cSld>
-  <p:clrMapOvr>
-    <a:masterClrMapping/>
-  </p:clrMapOvr>
-  <p:timing>
-    <p:tnLst>
-      <p:par>
-        <p:cTn id="1" dur="indefinite" restart="never" nodeType="tmRoot"/>
-      </p:par>
-    </p:tnLst>
-  </p:timing>
-</p:sld>
-</file>
-
-<file path=ppt/slides/slide8.xml><?xml version="1.0" encoding="utf-8"?>
-<p:sld xmlns:a="http://schemas.openxmlformats.org/drawingml/2006/main" xmlns:r="http://schemas.openxmlformats.org/officeDocument/2006/relationships" xmlns:p="http://schemas.openxmlformats.org/presentationml/2006/main">
-  <p:cSld>
-    <p:spTree>
-      <p:nvGrpSpPr>
-        <p:cNvPr id="1" name=""/>
-        <p:cNvGrpSpPr/>
-        <p:nvPr/>
-      </p:nvGrpSpPr>
-      <p:grpSpPr>
-        <a:xfrm>
-          <a:off x="0" y="0"/>
-          <a:ext cx="0" cy="0"/>
-          <a:chOff x="0" y="0"/>
-          <a:chExt cx="0" cy="0"/>
-        </a:xfrm>
-      </p:grpSpPr>
-      <p:sp>
-        <p:nvSpPr>
-          <p:cNvPr id="2" name="Title 1"/>
-          <p:cNvSpPr>
-            <a:spLocks noGrp="1"/>
-          </p:cNvSpPr>
-          <p:nvPr>
-            <p:ph type="title"/>
-          </p:nvPr>
-        </p:nvSpPr>
-        <p:spPr/>
-        <p:txBody>
-          <a:bodyPr/>
-          <a:lstStyle/>
-          <a:p>
-            <a:r>
-              <a:rPr lang="en-US" dirty="0" smtClean="0"/>
-              <a:t>MBO Activity Diagram (only for modules with algorithms)</a:t>
-            </a:r>
-            <a:endParaRPr lang="en-US" dirty="0"/>
-          </a:p>
-        </p:txBody>
-      </p:sp>
-      <p:sp>
-        <p:nvSpPr>
-          <p:cNvPr id="3" name="Content Placeholder 2"/>
-          <p:cNvSpPr>
-            <a:spLocks noGrp="1"/>
-          </p:cNvSpPr>
-          <p:nvPr>
-            <p:ph idx="1"/>
-          </p:nvPr>
-        </p:nvSpPr>
-        <p:spPr/>
-        <p:txBody>
-          <a:bodyPr/>
-          <a:lstStyle/>
-          <a:p>
-            <a:endParaRPr lang="en-US"/>
-          </a:p>
-        </p:txBody>
-      </p:sp>
-    </p:spTree>
-    <p:extLst>
-      <p:ext uri="{BB962C8B-B14F-4D97-AF65-F5344CB8AC3E}">
-        <p14:creationId xmlns:p14="http://schemas.microsoft.com/office/powerpoint/2010/main" val="2251097469"/>
-      </p:ext>
-    </p:extLst>
-  </p:cSld>
-  <p:clrMapOvr>
-    <a:masterClrMapping/>
-  </p:clrMapOvr>
-  <p:timing>
-    <p:tnLst>
-      <p:par>
-        <p:cTn id="1" dur="indefinite" restart="never" nodeType="tmRoot"/>
-      </p:par>
-    </p:tnLst>
-  </p:timing>
-</p:sld>
-</file>
-
-<file path=ppt/slides/slide9.xml><?xml version="1.0" encoding="utf-8"?>
-<p:sld xmlns:a="http://schemas.openxmlformats.org/drawingml/2006/main" xmlns:r="http://schemas.openxmlformats.org/officeDocument/2006/relationships" xmlns:p="http://schemas.openxmlformats.org/presentationml/2006/main">
-  <p:cSld>
-    <p:spTree>
-      <p:nvGrpSpPr>
-        <p:cNvPr id="1" name=""/>
-        <p:cNvGrpSpPr/>
-        <p:nvPr/>
-      </p:nvGrpSpPr>
-      <p:grpSpPr>
-        <a:xfrm>
-          <a:off x="0" y="0"/>
-          <a:ext cx="0" cy="0"/>
-          <a:chOff x="0" y="0"/>
-          <a:chExt cx="0" cy="0"/>
-        </a:xfrm>
-      </p:grpSpPr>
-      <p:sp>
-        <p:nvSpPr>
-          <p:cNvPr id="2" name="Title 1"/>
-          <p:cNvSpPr>
-            <a:spLocks noGrp="1"/>
-          </p:cNvSpPr>
-          <p:nvPr>
-            <p:ph type="title"/>
-          </p:nvPr>
-        </p:nvSpPr>
-        <p:spPr/>
-        <p:txBody>
-          <a:bodyPr/>
-          <a:lstStyle/>
-          <a:p>
-            <a:r>
-              <a:rPr lang="en-US" dirty="0" smtClean="0"/>
-              <a:t>Train Model</a:t>
-            </a:r>
-            <a:endParaRPr lang="en-US" dirty="0"/>
-          </a:p>
-        </p:txBody>
-      </p:sp>
-      <p:sp>
-        <p:nvSpPr>
-          <p:cNvPr id="3" name="Content Placeholder 2"/>
-          <p:cNvSpPr>
-            <a:spLocks noGrp="1"/>
-          </p:cNvSpPr>
-          <p:nvPr>
-            <p:ph idx="1"/>
-          </p:nvPr>
-        </p:nvSpPr>
-        <p:spPr/>
-        <p:txBody>
-          <a:bodyPr/>
-          <a:lstStyle/>
-          <a:p>
-            <a:r>
-              <a:rPr lang="en-US" dirty="0" smtClean="0"/>
-              <a:t>Purpose</a:t>
-            </a:r>
-          </a:p>
-          <a:p>
-            <a:pPr lvl="1"/>
-            <a:r>
-              <a:rPr lang="en-US" dirty="0" smtClean="0"/>
-              <a:t>Accepts input </a:t>
-            </a:r>
-            <a:r>
-              <a:rPr lang="en-US" dirty="0"/>
-              <a:t>regarding the </a:t>
-            </a:r>
-            <a:r>
-              <a:rPr lang="en-US" dirty="0" err="1"/>
-              <a:t>setpoint</a:t>
-            </a:r>
-            <a:r>
-              <a:rPr lang="en-US" dirty="0"/>
-              <a:t> </a:t>
-            </a:r>
-            <a:r>
-              <a:rPr lang="en-US" dirty="0" smtClean="0"/>
-              <a:t>power, </a:t>
-            </a:r>
-            <a:r>
-              <a:rPr lang="en-US" dirty="0"/>
-              <a:t>brake command, speed limit, acceleration limit, deceleration limit, route information, temperature control, door open, door close, transponder input, track circuit input, and light controller for tunnel</a:t>
-            </a:r>
-            <a:r>
-              <a:rPr lang="en-US" dirty="0" smtClean="0"/>
-              <a:t>.</a:t>
-            </a:r>
-          </a:p>
-          <a:p>
-            <a:pPr lvl="1"/>
-            <a:r>
-              <a:rPr lang="en-US" dirty="0"/>
-              <a:t>Calculates the speed of the train based upon power input</a:t>
-            </a:r>
-            <a:r>
-              <a:rPr lang="en-US" dirty="0" smtClean="0"/>
-              <a:t>.</a:t>
-            </a:r>
-          </a:p>
-          <a:p>
-            <a:pPr lvl="1"/>
-            <a:r>
-              <a:rPr lang="en-US" dirty="0" smtClean="0"/>
-              <a:t>Displays information about next stop</a:t>
-            </a:r>
-          </a:p>
-          <a:p>
-            <a:pPr lvl="1"/>
-            <a:r>
-              <a:rPr lang="en-US" dirty="0" smtClean="0"/>
-              <a:t>Simulates train failures</a:t>
-            </a:r>
-            <a:endParaRPr lang="en-US" dirty="0"/>
-          </a:p>
-        </p:txBody>
-      </p:sp>
-    </p:spTree>
-    <p:extLst>
-      <p:ext uri="{BB962C8B-B14F-4D97-AF65-F5344CB8AC3E}">
-        <p14:creationId xmlns:p14="http://schemas.microsoft.com/office/powerpoint/2010/main" val="121172839"/>
       </p:ext>
     </p:extLst>
   </p:cSld>

</xml_diff>

<commit_message>
updated ppt with overall use cases
</commit_message>
<xml_diff>
--- a/Design Review/DesignReview.pptx
+++ b/Design Review/DesignReview.pptx
@@ -4341,25 +4341,47 @@
           </a:p>
         </p:txBody>
       </p:sp>
-      <p:sp>
-        <p:nvSpPr>
-          <p:cNvPr id="3" name="Content Placeholder 2"/>
-          <p:cNvSpPr>
-            <a:spLocks noGrp="1"/>
-          </p:cNvSpPr>
-          <p:nvPr>
-            <p:ph idx="1"/>
-          </p:nvPr>
-        </p:nvSpPr>
-        <p:spPr/>
-        <p:txBody>
-          <a:bodyPr/>
-          <a:lstStyle/>
-          <a:p>
-            <a:endParaRPr lang="en-US"/>
-          </a:p>
-        </p:txBody>
-      </p:sp>
+      <p:pic>
+        <p:nvPicPr>
+          <p:cNvPr id="1026" name="Picture 2" descr="C:\Users\coelabs\Documents\UseCaseDiagram.png"/>
+          <p:cNvPicPr>
+            <a:picLocks noChangeAspect="1" noChangeArrowheads="1"/>
+          </p:cNvPicPr>
+          <p:nvPr/>
+        </p:nvPicPr>
+        <p:blipFill>
+          <a:blip r:embed="rId2">
+            <a:extLst>
+              <a:ext uri="{28A0092B-C50C-407E-A947-70E740481C1C}">
+                <a14:useLocalDpi xmlns:a14="http://schemas.microsoft.com/office/drawing/2010/main" val="0"/>
+              </a:ext>
+            </a:extLst>
+          </a:blip>
+          <a:srcRect/>
+          <a:stretch>
+            <a:fillRect/>
+          </a:stretch>
+        </p:blipFill>
+        <p:spPr bwMode="auto">
+          <a:xfrm>
+            <a:off x="304800" y="1524000"/>
+            <a:ext cx="8002289" cy="6858000"/>
+          </a:xfrm>
+          <a:prstGeom prst="rect">
+            <a:avLst/>
+          </a:prstGeom>
+          <a:noFill/>
+          <a:extLst>
+            <a:ext uri="{909E8E84-426E-40DD-AFC4-6F175D3DCCD1}">
+              <a14:hiddenFill xmlns:a14="http://schemas.microsoft.com/office/drawing/2010/main">
+                <a:solidFill>
+                  <a:srgbClr val="FFFFFF"/>
+                </a:solidFill>
+              </a14:hiddenFill>
+            </a:ext>
+          </a:extLst>
+        </p:spPr>
+      </p:pic>
     </p:spTree>
     <p:extLst>
       <p:ext uri="{BB962C8B-B14F-4D97-AF65-F5344CB8AC3E}">

</xml_diff>

<commit_message>
updated use case train model
</commit_message>
<xml_diff>
--- a/Design Review/DesignReview.pptx
+++ b/Design Review/DesignReview.pptx
@@ -3673,8 +3673,8 @@
         </p:blipFill>
         <p:spPr>
           <a:xfrm>
-            <a:off x="457200" y="914400"/>
-            <a:ext cx="9307585" cy="8001000"/>
+            <a:off x="883490" y="914400"/>
+            <a:ext cx="8455004" cy="8001000"/>
           </a:xfrm>
         </p:spPr>
       </p:pic>

</xml_diff>

<commit_message>
update ctc part in ppt
</commit_message>
<xml_diff>
--- a/Design Review/DesignReview.pptx
+++ b/Design Review/DesignReview.pptx
@@ -3424,11 +3424,7 @@
           <a:p>
             <a:r>
               <a:rPr lang="en-US" dirty="0" smtClean="0"/>
-              <a:t>MBO Activity </a:t>
-            </a:r>
-            <a:r>
-              <a:rPr lang="en-US" dirty="0" smtClean="0"/>
-              <a:t>Diagram</a:t>
+              <a:t>MBO Activity Diagram</a:t>
             </a:r>
             <a:endParaRPr lang="en-US" dirty="0"/>
           </a:p>
@@ -5444,7 +5440,7 @@
       </p:sp>
       <p:pic>
         <p:nvPicPr>
-          <p:cNvPr id="4098" name="Picture 2" descr="C:\Users\coelabs\Documents\GitHub\COE1186\ClassDiagram2.png"/>
+          <p:cNvPr id="1026" name="Picture 2" descr="C:\Users\coelabs\Documents\UseCaseDiagramCTC.png"/>
           <p:cNvPicPr>
             <a:picLocks noChangeAspect="1" noChangeArrowheads="1"/>
           </p:cNvPicPr>
@@ -5465,8 +5461,8 @@
         </p:blipFill>
         <p:spPr bwMode="auto">
           <a:xfrm>
-            <a:off x="0" y="990600"/>
-            <a:ext cx="9144000" cy="5258853"/>
+            <a:off x="-76200" y="1143000"/>
+            <a:ext cx="9144000" cy="5334702"/>
           </a:xfrm>
           <a:prstGeom prst="rect">
             <a:avLst/>

</xml_diff>

<commit_message>
added mbo sequence diagram
</commit_message>
<xml_diff>
--- a/Design Review/DesignReview.pptx
+++ b/Design Review/DesignReview.pptx
@@ -3351,25 +3351,34 @@
           </a:p>
         </p:txBody>
       </p:sp>
-      <p:sp>
-        <p:nvSpPr>
-          <p:cNvPr id="3" name="Content Placeholder 2"/>
-          <p:cNvSpPr>
-            <a:spLocks noGrp="1"/>
-          </p:cNvSpPr>
+      <p:pic>
+        <p:nvPicPr>
+          <p:cNvPr id="4" name="Content Placeholder 3"/>
+          <p:cNvPicPr>
+            <a:picLocks noGrp="1" noChangeAspect="1"/>
+          </p:cNvPicPr>
           <p:nvPr>
             <p:ph idx="1"/>
           </p:nvPr>
-        </p:nvSpPr>
-        <p:spPr/>
-        <p:txBody>
-          <a:bodyPr/>
-          <a:lstStyle/>
-          <a:p>
-            <a:endParaRPr lang="en-US"/>
-          </a:p>
-        </p:txBody>
-      </p:sp>
+        </p:nvPicPr>
+        <p:blipFill rotWithShape="1">
+          <a:blip r:embed="rId2" cstate="print">
+            <a:extLst>
+              <a:ext uri="{28A0092B-C50C-407E-A947-70E740481C1C}">
+                <a14:useLocalDpi xmlns:a14="http://schemas.microsoft.com/office/drawing/2010/main" val="0"/>
+              </a:ext>
+            </a:extLst>
+          </a:blip>
+          <a:srcRect l="22799" r="21204" b="50737"/>
+          <a:stretch/>
+        </p:blipFill>
+        <p:spPr>
+          <a:xfrm>
+            <a:off x="1524000" y="1828800"/>
+            <a:ext cx="5394883" cy="4343400"/>
+          </a:xfrm>
+        </p:spPr>
+      </p:pic>
     </p:spTree>
     <p:extLst>
       <p:ext uri="{BB962C8B-B14F-4D97-AF65-F5344CB8AC3E}">

</xml_diff>

<commit_message>
fixed typos in train model slides
</commit_message>
<xml_diff>
--- a/Design Review/DesignReview.pptx
+++ b/Design Review/DesignReview.pptx
@@ -129,6 +129,22 @@
       </a:defRPr>
     </a:lvl9pPr>
   </p:defaultTextStyle>
+  <p:extLst>
+    <p:ext uri="{EFAFB233-063F-42B5-8137-9DF3F51BA10A}">
+      <p15:sldGuideLst xmlns:p15="http://schemas.microsoft.com/office/powerpoint/2012/main">
+        <p15:guide id="1" orient="horz" pos="2160">
+          <p15:clr>
+            <a:srgbClr val="A4A3A4"/>
+          </p15:clr>
+        </p15:guide>
+        <p15:guide id="2" pos="2880">
+          <p15:clr>
+            <a:srgbClr val="A4A3A4"/>
+          </p15:clr>
+        </p15:guide>
+      </p15:sldGuideLst>
+    </p:ext>
+  </p:extLst>
 </p:presentation>
 </file>
 
@@ -326,7 +342,7 @@
           <a:p>
             <a:fld id="{F6A57CFB-2169-4F60-82B5-66CB228E306E}" type="datetimeFigureOut">
               <a:rPr lang="en-US" smtClean="0"/>
-              <a:t>10/31/2013</a:t>
+              <a:t>11/5/2013</a:t>
             </a:fld>
             <a:endParaRPr lang="en-US"/>
           </a:p>
@@ -491,7 +507,7 @@
           <a:p>
             <a:fld id="{F6A57CFB-2169-4F60-82B5-66CB228E306E}" type="datetimeFigureOut">
               <a:rPr lang="en-US" smtClean="0"/>
-              <a:t>10/31/2013</a:t>
+              <a:t>11/5/2013</a:t>
             </a:fld>
             <a:endParaRPr lang="en-US"/>
           </a:p>
@@ -666,7 +682,7 @@
           <a:p>
             <a:fld id="{F6A57CFB-2169-4F60-82B5-66CB228E306E}" type="datetimeFigureOut">
               <a:rPr lang="en-US" smtClean="0"/>
-              <a:t>10/31/2013</a:t>
+              <a:t>11/5/2013</a:t>
             </a:fld>
             <a:endParaRPr lang="en-US"/>
           </a:p>
@@ -831,7 +847,7 @@
           <a:p>
             <a:fld id="{F6A57CFB-2169-4F60-82B5-66CB228E306E}" type="datetimeFigureOut">
               <a:rPr lang="en-US" smtClean="0"/>
-              <a:t>10/31/2013</a:t>
+              <a:t>11/5/2013</a:t>
             </a:fld>
             <a:endParaRPr lang="en-US"/>
           </a:p>
@@ -1072,7 +1088,7 @@
           <a:p>
             <a:fld id="{F6A57CFB-2169-4F60-82B5-66CB228E306E}" type="datetimeFigureOut">
               <a:rPr lang="en-US" smtClean="0"/>
-              <a:t>10/31/2013</a:t>
+              <a:t>11/5/2013</a:t>
             </a:fld>
             <a:endParaRPr lang="en-US"/>
           </a:p>
@@ -1355,7 +1371,7 @@
           <a:p>
             <a:fld id="{F6A57CFB-2169-4F60-82B5-66CB228E306E}" type="datetimeFigureOut">
               <a:rPr lang="en-US" smtClean="0"/>
-              <a:t>10/31/2013</a:t>
+              <a:t>11/5/2013</a:t>
             </a:fld>
             <a:endParaRPr lang="en-US"/>
           </a:p>
@@ -1784,7 +1800,7 @@
           <a:p>
             <a:fld id="{F6A57CFB-2169-4F60-82B5-66CB228E306E}" type="datetimeFigureOut">
               <a:rPr lang="en-US" smtClean="0"/>
-              <a:t>10/31/2013</a:t>
+              <a:t>11/5/2013</a:t>
             </a:fld>
             <a:endParaRPr lang="en-US"/>
           </a:p>
@@ -1897,7 +1913,7 @@
           <a:p>
             <a:fld id="{F6A57CFB-2169-4F60-82B5-66CB228E306E}" type="datetimeFigureOut">
               <a:rPr lang="en-US" smtClean="0"/>
-              <a:t>10/31/2013</a:t>
+              <a:t>11/5/2013</a:t>
             </a:fld>
             <a:endParaRPr lang="en-US"/>
           </a:p>
@@ -1987,7 +2003,7 @@
           <a:p>
             <a:fld id="{F6A57CFB-2169-4F60-82B5-66CB228E306E}" type="datetimeFigureOut">
               <a:rPr lang="en-US" smtClean="0"/>
-              <a:t>10/31/2013</a:t>
+              <a:t>11/5/2013</a:t>
             </a:fld>
             <a:endParaRPr lang="en-US"/>
           </a:p>
@@ -2176,7 +2192,7 @@
           <a:p>
             <a:fld id="{F6A57CFB-2169-4F60-82B5-66CB228E306E}" type="datetimeFigureOut">
               <a:rPr lang="en-US" smtClean="0"/>
-              <a:t>10/31/2013</a:t>
+              <a:t>11/5/2013</a:t>
             </a:fld>
             <a:endParaRPr lang="en-US"/>
           </a:p>
@@ -2494,7 +2510,7 @@
           <a:p>
             <a:fld id="{F6A57CFB-2169-4F60-82B5-66CB228E306E}" type="datetimeFigureOut">
               <a:rPr lang="en-US" smtClean="0"/>
-              <a:t>10/31/2013</a:t>
+              <a:t>11/5/2013</a:t>
             </a:fld>
             <a:endParaRPr lang="en-US"/>
           </a:p>
@@ -2873,7 +2889,7 @@
           <a:p>
             <a:fld id="{F6A57CFB-2169-4F60-82B5-66CB228E306E}" type="datetimeFigureOut">
               <a:rPr lang="en-US" smtClean="0"/>
-              <a:t>10/31/2013</a:t>
+              <a:t>11/5/2013</a:t>
             </a:fld>
             <a:endParaRPr lang="en-US"/>
           </a:p>
@@ -3695,8 +3711,8 @@
         </p:blipFill>
         <p:spPr>
           <a:xfrm>
-            <a:off x="457200" y="914400"/>
-            <a:ext cx="9307585" cy="8001000"/>
+            <a:off x="533400" y="1295400"/>
+            <a:ext cx="6272964" cy="7391400"/>
           </a:xfrm>
         </p:spPr>
       </p:pic>
@@ -3761,8 +3777,8 @@
         </p:blipFill>
         <p:spPr>
           <a:xfrm>
-            <a:off x="-902649" y="0"/>
-            <a:ext cx="10795998" cy="11005737"/>
+            <a:off x="-902649" y="359806"/>
+            <a:ext cx="10795998" cy="10286125"/>
           </a:xfrm>
         </p:spPr>
       </p:pic>

</xml_diff>

<commit_message>
fixed track model slides
</commit_message>
<xml_diff>
--- a/Design Review/DesignReview.pptx
+++ b/Design Review/DesignReview.pptx
@@ -28,9 +28,10 @@
     <p:sldId id="268" r:id="rId22"/>
     <p:sldId id="269" r:id="rId23"/>
     <p:sldId id="274" r:id="rId24"/>
-    <p:sldId id="262" r:id="rId25"/>
-    <p:sldId id="273" r:id="rId26"/>
-    <p:sldId id="281" r:id="rId27"/>
+    <p:sldId id="283" r:id="rId25"/>
+    <p:sldId id="262" r:id="rId26"/>
+    <p:sldId id="273" r:id="rId27"/>
+    <p:sldId id="281" r:id="rId28"/>
   </p:sldIdLst>
   <p:sldSz cx="9144000" cy="6858000" type="screen4x3"/>
   <p:notesSz cx="7010400" cy="9296400"/>
@@ -131,7 +132,7 @@
   </p:defaultTextStyle>
   <p:extLst>
     <p:ext uri="{EFAFB233-063F-42B5-8137-9DF3F51BA10A}">
-      <p15:sldGuideLst xmlns:p15="http://schemas.microsoft.com/office/powerpoint/2012/main">
+      <p15:sldGuideLst xmlns:p15="http://schemas.microsoft.com/office/powerpoint/2012/main" xmlns="">
         <p15:guide id="1" orient="horz" pos="2160">
           <p15:clr>
             <a:srgbClr val="A4A3A4"/>
@@ -342,7 +343,7 @@
           <a:p>
             <a:fld id="{F6A57CFB-2169-4F60-82B5-66CB228E306E}" type="datetimeFigureOut">
               <a:rPr lang="en-US" smtClean="0"/>
-              <a:t>11/5/2013</a:t>
+              <a:t>11/6/2013</a:t>
             </a:fld>
             <a:endParaRPr lang="en-US"/>
           </a:p>
@@ -507,7 +508,7 @@
           <a:p>
             <a:fld id="{F6A57CFB-2169-4F60-82B5-66CB228E306E}" type="datetimeFigureOut">
               <a:rPr lang="en-US" smtClean="0"/>
-              <a:t>11/5/2013</a:t>
+              <a:t>11/6/2013</a:t>
             </a:fld>
             <a:endParaRPr lang="en-US"/>
           </a:p>
@@ -682,7 +683,7 @@
           <a:p>
             <a:fld id="{F6A57CFB-2169-4F60-82B5-66CB228E306E}" type="datetimeFigureOut">
               <a:rPr lang="en-US" smtClean="0"/>
-              <a:t>11/5/2013</a:t>
+              <a:t>11/6/2013</a:t>
             </a:fld>
             <a:endParaRPr lang="en-US"/>
           </a:p>
@@ -847,7 +848,7 @@
           <a:p>
             <a:fld id="{F6A57CFB-2169-4F60-82B5-66CB228E306E}" type="datetimeFigureOut">
               <a:rPr lang="en-US" smtClean="0"/>
-              <a:t>11/5/2013</a:t>
+              <a:t>11/6/2013</a:t>
             </a:fld>
             <a:endParaRPr lang="en-US"/>
           </a:p>
@@ -1088,7 +1089,7 @@
           <a:p>
             <a:fld id="{F6A57CFB-2169-4F60-82B5-66CB228E306E}" type="datetimeFigureOut">
               <a:rPr lang="en-US" smtClean="0"/>
-              <a:t>11/5/2013</a:t>
+              <a:t>11/6/2013</a:t>
             </a:fld>
             <a:endParaRPr lang="en-US"/>
           </a:p>
@@ -1371,7 +1372,7 @@
           <a:p>
             <a:fld id="{F6A57CFB-2169-4F60-82B5-66CB228E306E}" type="datetimeFigureOut">
               <a:rPr lang="en-US" smtClean="0"/>
-              <a:t>11/5/2013</a:t>
+              <a:t>11/6/2013</a:t>
             </a:fld>
             <a:endParaRPr lang="en-US"/>
           </a:p>
@@ -1800,7 +1801,7 @@
           <a:p>
             <a:fld id="{F6A57CFB-2169-4F60-82B5-66CB228E306E}" type="datetimeFigureOut">
               <a:rPr lang="en-US" smtClean="0"/>
-              <a:t>11/5/2013</a:t>
+              <a:t>11/6/2013</a:t>
             </a:fld>
             <a:endParaRPr lang="en-US"/>
           </a:p>
@@ -1913,7 +1914,7 @@
           <a:p>
             <a:fld id="{F6A57CFB-2169-4F60-82B5-66CB228E306E}" type="datetimeFigureOut">
               <a:rPr lang="en-US" smtClean="0"/>
-              <a:t>11/5/2013</a:t>
+              <a:t>11/6/2013</a:t>
             </a:fld>
             <a:endParaRPr lang="en-US"/>
           </a:p>
@@ -2003,7 +2004,7 @@
           <a:p>
             <a:fld id="{F6A57CFB-2169-4F60-82B5-66CB228E306E}" type="datetimeFigureOut">
               <a:rPr lang="en-US" smtClean="0"/>
-              <a:t>11/5/2013</a:t>
+              <a:t>11/6/2013</a:t>
             </a:fld>
             <a:endParaRPr lang="en-US"/>
           </a:p>
@@ -2192,7 +2193,7 @@
           <a:p>
             <a:fld id="{F6A57CFB-2169-4F60-82B5-66CB228E306E}" type="datetimeFigureOut">
               <a:rPr lang="en-US" smtClean="0"/>
-              <a:t>11/5/2013</a:t>
+              <a:t>11/6/2013</a:t>
             </a:fld>
             <a:endParaRPr lang="en-US"/>
           </a:p>
@@ -2510,7 +2511,7 @@
           <a:p>
             <a:fld id="{F6A57CFB-2169-4F60-82B5-66CB228E306E}" type="datetimeFigureOut">
               <a:rPr lang="en-US" smtClean="0"/>
-              <a:t>11/5/2013</a:t>
+              <a:t>11/6/2013</a:t>
             </a:fld>
             <a:endParaRPr lang="en-US"/>
           </a:p>
@@ -2889,7 +2890,7 @@
           <a:p>
             <a:fld id="{F6A57CFB-2169-4F60-82B5-66CB228E306E}" type="datetimeFigureOut">
               <a:rPr lang="en-US" smtClean="0"/>
-              <a:t>11/5/2013</a:t>
+              <a:t>11/6/2013</a:t>
             </a:fld>
             <a:endParaRPr lang="en-US"/>
           </a:p>
@@ -4536,42 +4537,16 @@
             </a:br>
             <a:r>
               <a:rPr lang="en-US" dirty="0" smtClean="0"/>
-              <a:t>Track Controller/Track Model</a:t>
+              <a:t>Track </a:t>
+            </a:r>
+            <a:r>
+              <a:rPr lang="en-US" dirty="0" smtClean="0"/>
+              <a:t>Controller</a:t>
             </a:r>
             <a:endParaRPr lang="en-US" dirty="0"/>
           </a:p>
         </p:txBody>
       </p:sp>
-      <p:pic>
-        <p:nvPicPr>
-          <p:cNvPr id="3" name="Picture 2"/>
-          <p:cNvPicPr>
-            <a:picLocks noChangeAspect="1"/>
-          </p:cNvPicPr>
-          <p:nvPr/>
-        </p:nvPicPr>
-        <p:blipFill>
-          <a:blip r:embed="rId2">
-            <a:extLst>
-              <a:ext uri="{28A0092B-C50C-407E-A947-70E740481C1C}">
-                <a14:useLocalDpi xmlns:a14="http://schemas.microsoft.com/office/drawing/2010/main" val="0"/>
-              </a:ext>
-            </a:extLst>
-          </a:blip>
-          <a:stretch>
-            <a:fillRect/>
-          </a:stretch>
-        </p:blipFill>
-        <p:spPr>
-          <a:xfrm>
-            <a:off x="609600" y="1600200"/>
-            <a:ext cx="8648700" cy="4953000"/>
-          </a:xfrm>
-          <a:prstGeom prst="rect">
-            <a:avLst/>
-          </a:prstGeom>
-        </p:spPr>
-      </p:pic>
     </p:spTree>
     <p:extLst>
       <p:ext uri="{BB962C8B-B14F-4D97-AF65-F5344CB8AC3E}">
@@ -4971,7 +4946,7 @@
           <a:p>
             <a:r>
               <a:rPr lang="en-US" dirty="0" smtClean="0"/>
-              <a:t>Track Model: Class Diagram</a:t>
+              <a:t>Track Model: Use Cases</a:t>
             </a:r>
             <a:endParaRPr lang="en-US" dirty="0"/>
           </a:p>
@@ -4979,7 +4954,7 @@
       </p:sp>
       <p:pic>
         <p:nvPicPr>
-          <p:cNvPr id="4" name="Content Placeholder 3"/>
+          <p:cNvPr id="6" name="Content Placeholder 5"/>
           <p:cNvPicPr>
             <a:picLocks noGrp="1" noChangeAspect="1"/>
           </p:cNvPicPr>
@@ -5001,15 +4976,15 @@
         </p:blipFill>
         <p:spPr>
           <a:xfrm>
-            <a:off x="457200" y="1661827"/>
-            <a:ext cx="7620000" cy="4677345"/>
+            <a:off x="1532466" y="1828800"/>
+            <a:ext cx="4677592" cy="3714557"/>
           </a:xfrm>
         </p:spPr>
       </p:pic>
     </p:spTree>
     <p:extLst>
       <p:ext uri="{BB962C8B-B14F-4D97-AF65-F5344CB8AC3E}">
-        <p14:creationId xmlns:p14="http://schemas.microsoft.com/office/powerpoint/2010/main" val="2371159061"/>
+        <p14:creationId xmlns:p14="http://schemas.microsoft.com/office/powerpoint/2010/main" val="2518423244"/>
       </p:ext>
     </p:extLst>
   </p:cSld>
@@ -5051,10 +5026,9 @@
           <a:bodyPr/>
           <a:lstStyle/>
           <a:p>
-            <a:pPr algn="ctr"/>
-            <a:r>
-              <a:rPr lang="en-US" dirty="0" smtClean="0"/>
-              <a:t>Track Model: Sequence Diagram</a:t>
+            <a:r>
+              <a:rPr lang="en-US" dirty="0" smtClean="0"/>
+              <a:t>Track Model: Class Diagram</a:t>
             </a:r>
             <a:endParaRPr lang="en-US" dirty="0"/>
           </a:p>
@@ -5062,7 +5036,7 @@
       </p:sp>
       <p:pic>
         <p:nvPicPr>
-          <p:cNvPr id="4" name="Content Placeholder 3"/>
+          <p:cNvPr id="5" name="Content Placeholder 4"/>
           <p:cNvPicPr>
             <a:picLocks noGrp="1" noChangeAspect="1"/>
           </p:cNvPicPr>
@@ -5084,8 +5058,91 @@
         </p:blipFill>
         <p:spPr>
           <a:xfrm>
-            <a:off x="-27709" y="1524000"/>
-            <a:ext cx="8775699" cy="4876799"/>
+            <a:off x="-194827" y="1774196"/>
+            <a:ext cx="8961012" cy="5236204"/>
+          </a:xfrm>
+        </p:spPr>
+      </p:pic>
+    </p:spTree>
+    <p:extLst>
+      <p:ext uri="{BB962C8B-B14F-4D97-AF65-F5344CB8AC3E}">
+        <p14:creationId xmlns:p14="http://schemas.microsoft.com/office/powerpoint/2010/main" val="2371159061"/>
+      </p:ext>
+    </p:extLst>
+  </p:cSld>
+  <p:clrMapOvr>
+    <a:masterClrMapping/>
+  </p:clrMapOvr>
+</p:sld>
+</file>
+
+<file path=ppt/slides/slide26.xml><?xml version="1.0" encoding="utf-8"?>
+<p:sld xmlns:a="http://schemas.openxmlformats.org/drawingml/2006/main" xmlns:r="http://schemas.openxmlformats.org/officeDocument/2006/relationships" xmlns:p="http://schemas.openxmlformats.org/presentationml/2006/main">
+  <p:cSld>
+    <p:spTree>
+      <p:nvGrpSpPr>
+        <p:cNvPr id="1" name=""/>
+        <p:cNvGrpSpPr/>
+        <p:nvPr/>
+      </p:nvGrpSpPr>
+      <p:grpSpPr>
+        <a:xfrm>
+          <a:off x="0" y="0"/>
+          <a:ext cx="0" cy="0"/>
+          <a:chOff x="0" y="0"/>
+          <a:chExt cx="0" cy="0"/>
+        </a:xfrm>
+      </p:grpSpPr>
+      <p:sp>
+        <p:nvSpPr>
+          <p:cNvPr id="2" name="Title 1"/>
+          <p:cNvSpPr>
+            <a:spLocks noGrp="1"/>
+          </p:cNvSpPr>
+          <p:nvPr>
+            <p:ph type="title"/>
+          </p:nvPr>
+        </p:nvSpPr>
+        <p:spPr/>
+        <p:txBody>
+          <a:bodyPr/>
+          <a:lstStyle/>
+          <a:p>
+            <a:pPr algn="ctr"/>
+            <a:r>
+              <a:rPr lang="en-US" dirty="0" smtClean="0"/>
+              <a:t>Track Model: Sequence Diagram</a:t>
+            </a:r>
+            <a:endParaRPr lang="en-US" dirty="0"/>
+          </a:p>
+        </p:txBody>
+      </p:sp>
+      <p:pic>
+        <p:nvPicPr>
+          <p:cNvPr id="5" name="Content Placeholder 4"/>
+          <p:cNvPicPr>
+            <a:picLocks noGrp="1" noChangeAspect="1"/>
+          </p:cNvPicPr>
+          <p:nvPr>
+            <p:ph idx="1"/>
+          </p:nvPr>
+        </p:nvPicPr>
+        <p:blipFill>
+          <a:blip r:embed="rId2">
+            <a:extLst>
+              <a:ext uri="{28A0092B-C50C-407E-A947-70E740481C1C}">
+                <a14:useLocalDpi xmlns:a14="http://schemas.microsoft.com/office/drawing/2010/main" val="0"/>
+              </a:ext>
+            </a:extLst>
+          </a:blip>
+          <a:stretch>
+            <a:fillRect/>
+          </a:stretch>
+        </p:blipFill>
+        <p:spPr>
+          <a:xfrm>
+            <a:off x="-152400" y="1676400"/>
+            <a:ext cx="8817714" cy="4876800"/>
           </a:xfrm>
         </p:spPr>
       </p:pic>
@@ -5102,7 +5159,7 @@
 </p:sld>
 </file>
 
-<file path=ppt/slides/slide26.xml><?xml version="1.0" encoding="utf-8"?>
+<file path=ppt/slides/slide27.xml><?xml version="1.0" encoding="utf-8"?>
 <p:sld xmlns:a="http://schemas.openxmlformats.org/drawingml/2006/main" xmlns:r="http://schemas.openxmlformats.org/officeDocument/2006/relationships" xmlns:p="http://schemas.openxmlformats.org/presentationml/2006/main">
   <p:cSld>
     <p:spTree>

</xml_diff>